<commit_message>
Still finalizing the model and writing the report.
</commit_message>
<xml_diff>
--- a/markdown/release_comp_fig.pptx
+++ b/markdown/release_comp_fig.pptx
@@ -108,6 +108,11 @@
       </a:defRPr>
     </a:lvl9pPr>
   </p:defaultTextStyle>
+  <p:extLst>
+    <p:ext uri="{EFAFB233-063F-42B5-8137-9DF3F51BA10A}">
+      <p15:sldGuideLst xmlns:p15="http://schemas.microsoft.com/office/powerpoint/2012/main"/>
+    </p:ext>
+  </p:extLst>
 </p:presentation>
 </file>
 
@@ -193,7 +198,7 @@
           <a:p>
             <a:fld id="{9C52CAAB-CF90-4FD0-A236-B9E10D665356}" type="datetimeFigureOut">
               <a:rPr lang="en-US" smtClean="0"/>
-              <a:t>5/28/2025</a:t>
+              <a:t>5/29/2025</a:t>
             </a:fld>
             <a:endParaRPr lang="en-US"/>
           </a:p>
@@ -823,7 +828,7 @@
           <a:p>
             <a:fld id="{0C930631-FCD7-49E8-918F-66F6C8B50496}" type="datetimeFigureOut">
               <a:rPr lang="en-US" smtClean="0"/>
-              <a:t>5/28/2025</a:t>
+              <a:t>5/29/2025</a:t>
             </a:fld>
             <a:endParaRPr lang="en-US"/>
           </a:p>
@@ -1021,7 +1026,7 @@
           <a:p>
             <a:fld id="{0C930631-FCD7-49E8-918F-66F6C8B50496}" type="datetimeFigureOut">
               <a:rPr lang="en-US" smtClean="0"/>
-              <a:t>5/28/2025</a:t>
+              <a:t>5/29/2025</a:t>
             </a:fld>
             <a:endParaRPr lang="en-US"/>
           </a:p>
@@ -1229,7 +1234,7 @@
           <a:p>
             <a:fld id="{0C930631-FCD7-49E8-918F-66F6C8B50496}" type="datetimeFigureOut">
               <a:rPr lang="en-US" smtClean="0"/>
-              <a:t>5/28/2025</a:t>
+              <a:t>5/29/2025</a:t>
             </a:fld>
             <a:endParaRPr lang="en-US"/>
           </a:p>
@@ -1427,7 +1432,7 @@
           <a:p>
             <a:fld id="{0C930631-FCD7-49E8-918F-66F6C8B50496}" type="datetimeFigureOut">
               <a:rPr lang="en-US" smtClean="0"/>
-              <a:t>5/28/2025</a:t>
+              <a:t>5/29/2025</a:t>
             </a:fld>
             <a:endParaRPr lang="en-US"/>
           </a:p>
@@ -1702,7 +1707,7 @@
           <a:p>
             <a:fld id="{0C930631-FCD7-49E8-918F-66F6C8B50496}" type="datetimeFigureOut">
               <a:rPr lang="en-US" smtClean="0"/>
-              <a:t>5/28/2025</a:t>
+              <a:t>5/29/2025</a:t>
             </a:fld>
             <a:endParaRPr lang="en-US"/>
           </a:p>
@@ -1967,7 +1972,7 @@
           <a:p>
             <a:fld id="{0C930631-FCD7-49E8-918F-66F6C8B50496}" type="datetimeFigureOut">
               <a:rPr lang="en-US" smtClean="0"/>
-              <a:t>5/28/2025</a:t>
+              <a:t>5/29/2025</a:t>
             </a:fld>
             <a:endParaRPr lang="en-US"/>
           </a:p>
@@ -2379,7 +2384,7 @@
           <a:p>
             <a:fld id="{0C930631-FCD7-49E8-918F-66F6C8B50496}" type="datetimeFigureOut">
               <a:rPr lang="en-US" smtClean="0"/>
-              <a:t>5/28/2025</a:t>
+              <a:t>5/29/2025</a:t>
             </a:fld>
             <a:endParaRPr lang="en-US"/>
           </a:p>
@@ -2520,7 +2525,7 @@
           <a:p>
             <a:fld id="{0C930631-FCD7-49E8-918F-66F6C8B50496}" type="datetimeFigureOut">
               <a:rPr lang="en-US" smtClean="0"/>
-              <a:t>5/28/2025</a:t>
+              <a:t>5/29/2025</a:t>
             </a:fld>
             <a:endParaRPr lang="en-US"/>
           </a:p>
@@ -2633,7 +2638,7 @@
           <a:p>
             <a:fld id="{0C930631-FCD7-49E8-918F-66F6C8B50496}" type="datetimeFigureOut">
               <a:rPr lang="en-US" smtClean="0"/>
-              <a:t>5/28/2025</a:t>
+              <a:t>5/29/2025</a:t>
             </a:fld>
             <a:endParaRPr lang="en-US"/>
           </a:p>
@@ -2944,7 +2949,7 @@
           <a:p>
             <a:fld id="{0C930631-FCD7-49E8-918F-66F6C8B50496}" type="datetimeFigureOut">
               <a:rPr lang="en-US" smtClean="0"/>
-              <a:t>5/28/2025</a:t>
+              <a:t>5/29/2025</a:t>
             </a:fld>
             <a:endParaRPr lang="en-US"/>
           </a:p>
@@ -3232,7 +3237,7 @@
           <a:p>
             <a:fld id="{0C930631-FCD7-49E8-918F-66F6C8B50496}" type="datetimeFigureOut">
               <a:rPr lang="en-US" smtClean="0"/>
-              <a:t>5/28/2025</a:t>
+              <a:t>5/29/2025</a:t>
             </a:fld>
             <a:endParaRPr lang="en-US"/>
           </a:p>
@@ -3473,7 +3478,7 @@
           <a:p>
             <a:fld id="{0C930631-FCD7-49E8-918F-66F6C8B50496}" type="datetimeFigureOut">
               <a:rPr lang="en-US" smtClean="0"/>
-              <a:t>5/28/2025</a:t>
+              <a:t>5/29/2025</a:t>
             </a:fld>
             <a:endParaRPr lang="en-US"/>
           </a:p>
@@ -6420,6 +6425,13 @@
           <a:ln>
             <a:noFill/>
           </a:ln>
+          <a:effectLst>
+            <a:outerShdw blurRad="50800" dist="38100" dir="2700000" algn="tl" rotWithShape="0">
+              <a:prstClr val="black">
+                <a:alpha val="40000"/>
+              </a:prstClr>
+            </a:outerShdw>
+          </a:effectLst>
         </p:spPr>
         <p:style>
           <a:lnRef idx="2">
@@ -6443,110 +6455,6 @@
           <a:p>
             <a:pPr algn="ctr"/>
             <a:endParaRPr lang="en-US"/>
-          </a:p>
-        </p:txBody>
-      </p:sp>
-      <p:cxnSp>
-        <p:nvCxnSpPr>
-          <p:cNvPr id="27" name="Connector: Elbow 26">
-            <a:extLst>
-              <a:ext uri="{FF2B5EF4-FFF2-40B4-BE49-F238E27FC236}">
-                <a16:creationId xmlns:a16="http://schemas.microsoft.com/office/drawing/2014/main" id="{1F0DB818-DB4F-6D84-49A9-6A1C3E4B637B}"/>
-              </a:ext>
-            </a:extLst>
-          </p:cNvPr>
-          <p:cNvCxnSpPr>
-            <a:cxnSpLocks/>
-          </p:cNvCxnSpPr>
-          <p:nvPr/>
-        </p:nvCxnSpPr>
-        <p:spPr>
-          <a:xfrm rot="10800000">
-            <a:off x="14260196" y="2539258"/>
-            <a:ext cx="810803" cy="597564"/>
-          </a:xfrm>
-          <a:prstGeom prst="bentConnector3">
-            <a:avLst/>
-          </a:prstGeom>
-          <a:ln>
-            <a:solidFill>
-              <a:schemeClr val="tx1"/>
-            </a:solidFill>
-            <a:headEnd type="triangle"/>
-            <a:tailEnd type="triangle"/>
-          </a:ln>
-        </p:spPr>
-        <p:style>
-          <a:lnRef idx="1">
-            <a:schemeClr val="accent1"/>
-          </a:lnRef>
-          <a:fillRef idx="0">
-            <a:schemeClr val="accent1"/>
-          </a:fillRef>
-          <a:effectRef idx="0">
-            <a:schemeClr val="accent1"/>
-          </a:effectRef>
-          <a:fontRef idx="minor">
-            <a:schemeClr val="tx1"/>
-          </a:fontRef>
-        </p:style>
-      </p:cxnSp>
-      <p:sp>
-        <p:nvSpPr>
-          <p:cNvPr id="7" name="Rectangle: Rounded Corners 6">
-            <a:extLst>
-              <a:ext uri="{FF2B5EF4-FFF2-40B4-BE49-F238E27FC236}">
-                <a16:creationId xmlns:a16="http://schemas.microsoft.com/office/drawing/2014/main" id="{4D3BDC8B-113E-34C5-7B81-1AD2432424BF}"/>
-              </a:ext>
-            </a:extLst>
-          </p:cNvPr>
-          <p:cNvSpPr/>
-          <p:nvPr/>
-        </p:nvSpPr>
-        <p:spPr>
-          <a:xfrm>
-            <a:off x="12393969" y="1794359"/>
-            <a:ext cx="2124075" cy="917892"/>
-          </a:xfrm>
-          <a:prstGeom prst="roundRect">
-            <a:avLst/>
-          </a:prstGeom>
-          <a:solidFill>
-            <a:schemeClr val="bg2"/>
-          </a:solidFill>
-          <a:ln>
-            <a:noFill/>
-          </a:ln>
-        </p:spPr>
-        <p:style>
-          <a:lnRef idx="2">
-            <a:schemeClr val="accent1">
-              <a:shade val="15000"/>
-            </a:schemeClr>
-          </a:lnRef>
-          <a:fillRef idx="1">
-            <a:schemeClr val="accent1"/>
-          </a:fillRef>
-          <a:effectRef idx="0">
-            <a:schemeClr val="accent1"/>
-          </a:effectRef>
-          <a:fontRef idx="minor">
-            <a:schemeClr val="lt1"/>
-          </a:fontRef>
-        </p:style>
-        <p:txBody>
-          <a:bodyPr rtlCol="0" anchor="ctr"/>
-          <a:lstStyle/>
-          <a:p>
-            <a:pPr algn="ctr"/>
-            <a:r>
-              <a:rPr lang="en-US" dirty="0">
-                <a:solidFill>
-                  <a:schemeClr val="tx1"/>
-                </a:solidFill>
-              </a:rPr>
-              <a:t>Unguided Black and Yelloweye Releases</a:t>
-            </a:r>
           </a:p>
         </p:txBody>
       </p:sp>
@@ -6674,6 +6582,13 @@
           <a:ln>
             <a:noFill/>
           </a:ln>
+          <a:effectLst>
+            <a:outerShdw blurRad="50800" dist="38100" dir="5400000" algn="t" rotWithShape="0">
+              <a:prstClr val="black">
+                <a:alpha val="40000"/>
+              </a:prstClr>
+            </a:outerShdw>
+          </a:effectLst>
         </p:spPr>
         <p:style>
           <a:lnRef idx="2">
@@ -6739,10 +6654,62 @@
       </p:sp>
       <p:sp>
         <p:nvSpPr>
-          <p:cNvPr id="15" name="Rectangle: Rounded Corners 14">
-            <a:extLst>
-              <a:ext uri="{FF2B5EF4-FFF2-40B4-BE49-F238E27FC236}">
-                <a16:creationId xmlns:a16="http://schemas.microsoft.com/office/drawing/2014/main" id="{962A63C9-327F-6DEE-10F3-26F248AC86A8}"/>
+          <p:cNvPr id="17" name="TextBox 16">
+            <a:extLst>
+              <a:ext uri="{FF2B5EF4-FFF2-40B4-BE49-F238E27FC236}">
+                <a16:creationId xmlns:a16="http://schemas.microsoft.com/office/drawing/2014/main" id="{E7975917-4681-8B6A-0213-A836537BD930}"/>
+              </a:ext>
+            </a:extLst>
+          </p:cNvPr>
+          <p:cNvSpPr txBox="1"/>
+          <p:nvPr/>
+        </p:nvSpPr>
+        <p:spPr>
+          <a:xfrm>
+            <a:off x="3516436" y="2461639"/>
+            <a:ext cx="3404394" cy="646331"/>
+          </a:xfrm>
+          <a:prstGeom prst="rect">
+            <a:avLst/>
+          </a:prstGeom>
+          <a:noFill/>
+          <a:ln>
+            <a:noFill/>
+          </a:ln>
+        </p:spPr>
+        <p:txBody>
+          <a:bodyPr wrap="none" rtlCol="0">
+            <a:spAutoFit/>
+          </a:bodyPr>
+          <a:lstStyle/>
+          <a:p>
+            <a:pPr marL="285750" indent="-285750">
+              <a:buFont typeface="Century Gothic" panose="020B0502020202020204" pitchFamily="34" charset="0"/>
+              <a:buChar char="→"/>
+            </a:pPr>
+            <a:r>
+              <a:rPr lang="en-US" dirty="0"/>
+              <a:t>Ignores different biases</a:t>
+            </a:r>
+          </a:p>
+          <a:p>
+            <a:pPr marL="285750" indent="-285750">
+              <a:buFont typeface="Century Gothic" panose="020B0502020202020204" pitchFamily="34" charset="0"/>
+              <a:buChar char="→"/>
+            </a:pPr>
+            <a:r>
+              <a:rPr lang="en-US" dirty="0"/>
+              <a:t>Assumes same ratio for all RF</a:t>
+            </a:r>
+          </a:p>
+        </p:txBody>
+      </p:sp>
+      <p:sp>
+        <p:nvSpPr>
+          <p:cNvPr id="24" name="Rectangle: Rounded Corners 23">
+            <a:extLst>
+              <a:ext uri="{FF2B5EF4-FFF2-40B4-BE49-F238E27FC236}">
+                <a16:creationId xmlns:a16="http://schemas.microsoft.com/office/drawing/2014/main" id="{AEB572FE-81B5-B86D-1075-595B38CF2A5F}"/>
               </a:ext>
             </a:extLst>
           </p:cNvPr>
@@ -6751,8 +6718,8 @@
         </p:nvSpPr>
         <p:spPr>
           <a:xfrm>
-            <a:off x="13008304" y="2988529"/>
-            <a:ext cx="2124075" cy="619125"/>
+            <a:off x="3593874" y="4496260"/>
+            <a:ext cx="1488205" cy="1346404"/>
           </a:xfrm>
           <a:prstGeom prst="roundRect">
             <a:avLst/>
@@ -6763,6 +6730,13 @@
           <a:ln>
             <a:noFill/>
           </a:ln>
+          <a:effectLst>
+            <a:outerShdw blurRad="50800" dist="38100" dir="5400000" algn="t" rotWithShape="0">
+              <a:prstClr val="black">
+                <a:alpha val="40000"/>
+              </a:prstClr>
+            </a:outerShdw>
+          </a:effectLst>
         </p:spPr>
         <p:style>
           <a:lnRef idx="2">
@@ -6791,17 +6765,28 @@
                   <a:schemeClr val="tx1"/>
                 </a:solidFill>
               </a:rPr>
-              <a:t>Port Sampling Species Comps</a:t>
-            </a:r>
-          </a:p>
-        </p:txBody>
-      </p:sp>
-      <p:sp>
-        <p:nvSpPr>
-          <p:cNvPr id="16" name="Multiplication Sign 15">
-            <a:extLst>
-              <a:ext uri="{FF2B5EF4-FFF2-40B4-BE49-F238E27FC236}">
-                <a16:creationId xmlns:a16="http://schemas.microsoft.com/office/drawing/2014/main" id="{26B344ED-A119-0420-C7B6-53E28CC01AF4}"/>
+              <a:t>Unguided offset </a:t>
+            </a:r>
+          </a:p>
+          <a:p>
+            <a:pPr algn="ctr"/>
+            <a:r>
+              <a:rPr lang="en-US" dirty="0">
+                <a:solidFill>
+                  <a:schemeClr val="tx1"/>
+                </a:solidFill>
+              </a:rPr>
+              <a:t>(estimated in model)</a:t>
+            </a:r>
+          </a:p>
+        </p:txBody>
+      </p:sp>
+      <p:sp>
+        <p:nvSpPr>
+          <p:cNvPr id="10" name="Rectangle: Rounded Corners 9">
+            <a:extLst>
+              <a:ext uri="{FF2B5EF4-FFF2-40B4-BE49-F238E27FC236}">
+                <a16:creationId xmlns:a16="http://schemas.microsoft.com/office/drawing/2014/main" id="{7EC07115-05F5-EC79-AD2F-3326370C33CC}"/>
               </a:ext>
             </a:extLst>
           </p:cNvPr>
@@ -6810,10 +6795,10 @@
         </p:nvSpPr>
         <p:spPr>
           <a:xfrm>
-            <a:off x="12612948" y="3109864"/>
-            <a:ext cx="309631" cy="344122"/>
+            <a:off x="227774" y="981802"/>
+            <a:ext cx="2124075" cy="619125"/>
           </a:xfrm>
-          <a:prstGeom prst="mathMultiply">
+          <a:prstGeom prst="roundRect">
             <a:avLst/>
           </a:prstGeom>
           <a:solidFill>
@@ -6822,6 +6807,13 @@
           <a:ln>
             <a:noFill/>
           </a:ln>
+          <a:effectLst>
+            <a:outerShdw blurRad="50800" dist="38100" dir="5400000" algn="t" rotWithShape="0">
+              <a:prstClr val="black">
+                <a:alpha val="40000"/>
+              </a:prstClr>
+            </a:outerShdw>
+          </a:effectLst>
         </p:spPr>
         <p:style>
           <a:lnRef idx="2">
@@ -6844,250 +6836,6 @@
           <a:lstStyle/>
           <a:p>
             <a:pPr algn="ctr"/>
-            <a:endParaRPr lang="en-US">
-              <a:solidFill>
-                <a:schemeClr val="tx1"/>
-              </a:solidFill>
-            </a:endParaRPr>
-          </a:p>
-        </p:txBody>
-      </p:sp>
-      <p:sp>
-        <p:nvSpPr>
-          <p:cNvPr id="17" name="TextBox 16">
-            <a:extLst>
-              <a:ext uri="{FF2B5EF4-FFF2-40B4-BE49-F238E27FC236}">
-                <a16:creationId xmlns:a16="http://schemas.microsoft.com/office/drawing/2014/main" id="{E7975917-4681-8B6A-0213-A836537BD930}"/>
-              </a:ext>
-            </a:extLst>
-          </p:cNvPr>
-          <p:cNvSpPr txBox="1"/>
-          <p:nvPr/>
-        </p:nvSpPr>
-        <p:spPr>
-          <a:xfrm>
-            <a:off x="3516436" y="2461639"/>
-            <a:ext cx="3404394" cy="646331"/>
-          </a:xfrm>
-          <a:prstGeom prst="rect">
-            <a:avLst/>
-          </a:prstGeom>
-          <a:noFill/>
-          <a:ln>
-            <a:noFill/>
-          </a:ln>
-        </p:spPr>
-        <p:txBody>
-          <a:bodyPr wrap="none" rtlCol="0">
-            <a:spAutoFit/>
-          </a:bodyPr>
-          <a:lstStyle/>
-          <a:p>
-            <a:pPr marL="285750" indent="-285750">
-              <a:buFont typeface="Century Gothic" panose="020B0502020202020204" pitchFamily="34" charset="0"/>
-              <a:buChar char="→"/>
-            </a:pPr>
-            <a:r>
-              <a:rPr lang="en-US" dirty="0"/>
-              <a:t>Ignores different biases</a:t>
-            </a:r>
-          </a:p>
-          <a:p>
-            <a:pPr marL="285750" indent="-285750">
-              <a:buFont typeface="Century Gothic" panose="020B0502020202020204" pitchFamily="34" charset="0"/>
-              <a:buChar char="→"/>
-            </a:pPr>
-            <a:r>
-              <a:rPr lang="en-US" dirty="0"/>
-              <a:t>Assumes same ratio for all RF</a:t>
-            </a:r>
-          </a:p>
-        </p:txBody>
-      </p:sp>
-      <p:sp>
-        <p:nvSpPr>
-          <p:cNvPr id="19" name="Rectangle: Rounded Corners 18">
-            <a:extLst>
-              <a:ext uri="{FF2B5EF4-FFF2-40B4-BE49-F238E27FC236}">
-                <a16:creationId xmlns:a16="http://schemas.microsoft.com/office/drawing/2014/main" id="{0E7FA9B6-F5C6-78C8-7C92-A7F80F5A0A94}"/>
-              </a:ext>
-            </a:extLst>
-          </p:cNvPr>
-          <p:cNvSpPr/>
-          <p:nvPr/>
-        </p:nvSpPr>
-        <p:spPr>
-          <a:xfrm>
-            <a:off x="12296252" y="4479"/>
-            <a:ext cx="2990851" cy="923330"/>
-          </a:xfrm>
-          <a:prstGeom prst="roundRect">
-            <a:avLst/>
-          </a:prstGeom>
-          <a:solidFill>
-            <a:schemeClr val="bg2"/>
-          </a:solidFill>
-          <a:ln>
-            <a:noFill/>
-          </a:ln>
-        </p:spPr>
-        <p:style>
-          <a:lnRef idx="2">
-            <a:schemeClr val="accent1">
-              <a:shade val="15000"/>
-            </a:schemeClr>
-          </a:lnRef>
-          <a:fillRef idx="1">
-            <a:schemeClr val="accent1"/>
-          </a:fillRef>
-          <a:effectRef idx="0">
-            <a:schemeClr val="accent1"/>
-          </a:effectRef>
-          <a:fontRef idx="minor">
-            <a:schemeClr val="lt1"/>
-          </a:fontRef>
-        </p:style>
-        <p:txBody>
-          <a:bodyPr rtlCol="0" anchor="ctr"/>
-          <a:lstStyle/>
-          <a:p>
-            <a:r>
-              <a:rPr lang="en-US" u="sng" dirty="0">
-                <a:solidFill>
-                  <a:schemeClr val="tx1"/>
-                </a:solidFill>
-              </a:rPr>
-              <a:t>pH = </a:t>
-            </a:r>
-            <a:r>
-              <a:rPr lang="en-US" dirty="0">
-                <a:solidFill>
-                  <a:schemeClr val="tx1"/>
-                </a:solidFill>
-              </a:rPr>
-              <a:t>LB Harv / (LB Harv + LB Rel)</a:t>
-            </a:r>
-          </a:p>
-        </p:txBody>
-      </p:sp>
-      <p:sp>
-        <p:nvSpPr>
-          <p:cNvPr id="24" name="Rectangle: Rounded Corners 23">
-            <a:extLst>
-              <a:ext uri="{FF2B5EF4-FFF2-40B4-BE49-F238E27FC236}">
-                <a16:creationId xmlns:a16="http://schemas.microsoft.com/office/drawing/2014/main" id="{AEB572FE-81B5-B86D-1075-595B38CF2A5F}"/>
-              </a:ext>
-            </a:extLst>
-          </p:cNvPr>
-          <p:cNvSpPr/>
-          <p:nvPr/>
-        </p:nvSpPr>
-        <p:spPr>
-          <a:xfrm>
-            <a:off x="3593874" y="4496260"/>
-            <a:ext cx="1488205" cy="1346404"/>
-          </a:xfrm>
-          <a:prstGeom prst="roundRect">
-            <a:avLst/>
-          </a:prstGeom>
-          <a:solidFill>
-            <a:schemeClr val="bg2"/>
-          </a:solidFill>
-          <a:ln>
-            <a:noFill/>
-          </a:ln>
-        </p:spPr>
-        <p:style>
-          <a:lnRef idx="2">
-            <a:schemeClr val="accent1">
-              <a:shade val="15000"/>
-            </a:schemeClr>
-          </a:lnRef>
-          <a:fillRef idx="1">
-            <a:schemeClr val="accent1"/>
-          </a:fillRef>
-          <a:effectRef idx="0">
-            <a:schemeClr val="accent1"/>
-          </a:effectRef>
-          <a:fontRef idx="minor">
-            <a:schemeClr val="lt1"/>
-          </a:fontRef>
-        </p:style>
-        <p:txBody>
-          <a:bodyPr rtlCol="0" anchor="ctr"/>
-          <a:lstStyle/>
-          <a:p>
-            <a:pPr algn="ctr"/>
-            <a:r>
-              <a:rPr lang="en-US" dirty="0">
-                <a:solidFill>
-                  <a:schemeClr val="tx1"/>
-                </a:solidFill>
-              </a:rPr>
-              <a:t>Unguided offset </a:t>
-            </a:r>
-          </a:p>
-          <a:p>
-            <a:pPr algn="ctr"/>
-            <a:r>
-              <a:rPr lang="en-US" dirty="0">
-                <a:solidFill>
-                  <a:schemeClr val="tx1"/>
-                </a:solidFill>
-              </a:rPr>
-              <a:t>(estimated in model)</a:t>
-            </a:r>
-          </a:p>
-        </p:txBody>
-      </p:sp>
-      <p:sp>
-        <p:nvSpPr>
-          <p:cNvPr id="10" name="Rectangle: Rounded Corners 9">
-            <a:extLst>
-              <a:ext uri="{FF2B5EF4-FFF2-40B4-BE49-F238E27FC236}">
-                <a16:creationId xmlns:a16="http://schemas.microsoft.com/office/drawing/2014/main" id="{7EC07115-05F5-EC79-AD2F-3326370C33CC}"/>
-              </a:ext>
-            </a:extLst>
-          </p:cNvPr>
-          <p:cNvSpPr/>
-          <p:nvPr/>
-        </p:nvSpPr>
-        <p:spPr>
-          <a:xfrm>
-            <a:off x="227774" y="981802"/>
-            <a:ext cx="2124075" cy="619125"/>
-          </a:xfrm>
-          <a:prstGeom prst="roundRect">
-            <a:avLst/>
-          </a:prstGeom>
-          <a:solidFill>
-            <a:schemeClr val="bg2"/>
-          </a:solidFill>
-          <a:ln>
-            <a:noFill/>
-          </a:ln>
-        </p:spPr>
-        <p:style>
-          <a:lnRef idx="2">
-            <a:schemeClr val="accent1">
-              <a:shade val="15000"/>
-            </a:schemeClr>
-          </a:lnRef>
-          <a:fillRef idx="1">
-            <a:schemeClr val="accent1"/>
-          </a:fillRef>
-          <a:effectRef idx="0">
-            <a:schemeClr val="accent1"/>
-          </a:effectRef>
-          <a:fontRef idx="minor">
-            <a:schemeClr val="lt1"/>
-          </a:fontRef>
-        </p:style>
-        <p:txBody>
-          <a:bodyPr rtlCol="0" anchor="ctr"/>
-          <a:lstStyle/>
-          <a:p>
-            <a:pPr algn="ctr"/>
             <a:r>
               <a:rPr lang="en-US" dirty="0">
                 <a:solidFill>
@@ -7125,6 +6873,13 @@
           <a:ln>
             <a:noFill/>
           </a:ln>
+          <a:effectLst>
+            <a:outerShdw blurRad="50800" dist="38100" dir="5400000" algn="t" rotWithShape="0">
+              <a:prstClr val="black">
+                <a:alpha val="40000"/>
+              </a:prstClr>
+            </a:outerShdw>
+          </a:effectLst>
         </p:spPr>
         <p:style>
           <a:lnRef idx="2">
@@ -7213,10 +6968,10 @@
       </p:sp>
       <p:sp>
         <p:nvSpPr>
-          <p:cNvPr id="29" name="Rectangle: Rounded Corners 28">
-            <a:extLst>
-              <a:ext uri="{FF2B5EF4-FFF2-40B4-BE49-F238E27FC236}">
-                <a16:creationId xmlns:a16="http://schemas.microsoft.com/office/drawing/2014/main" id="{B59427C2-4339-55DA-EB29-491C10B71FB9}"/>
+          <p:cNvPr id="31" name="Rectangle: Rounded Corners 30">
+            <a:extLst>
+              <a:ext uri="{FF2B5EF4-FFF2-40B4-BE49-F238E27FC236}">
+                <a16:creationId xmlns:a16="http://schemas.microsoft.com/office/drawing/2014/main" id="{87559085-1040-1A5B-11EA-F85E03CF65FD}"/>
               </a:ext>
             </a:extLst>
           </p:cNvPr>
@@ -7225,8 +6980,8 @@
         </p:nvSpPr>
         <p:spPr>
           <a:xfrm>
-            <a:off x="13041749" y="3995208"/>
-            <a:ext cx="2124075" cy="619125"/>
+            <a:off x="227774" y="1655553"/>
+            <a:ext cx="2338839" cy="619125"/>
           </a:xfrm>
           <a:prstGeom prst="roundRect">
             <a:avLst/>
@@ -7237,6 +6992,13 @@
           <a:ln>
             <a:noFill/>
           </a:ln>
+          <a:effectLst>
+            <a:outerShdw blurRad="50800" dist="38100" dir="5400000" algn="t" rotWithShape="0">
+              <a:prstClr val="black">
+                <a:alpha val="40000"/>
+              </a:prstClr>
+            </a:outerShdw>
+          </a:effectLst>
         </p:spPr>
         <p:style>
           <a:lnRef idx="2">
@@ -7265,76 +7027,6 @@
                   <a:schemeClr val="tx1"/>
                 </a:solidFill>
               </a:rPr>
-              <a:t>Guided Pelagic</a:t>
-            </a:r>
-          </a:p>
-          <a:p>
-            <a:pPr algn="ctr"/>
-            <a:r>
-              <a:rPr lang="en-US" dirty="0">
-                <a:solidFill>
-                  <a:schemeClr val="tx1"/>
-                </a:solidFill>
-              </a:rPr>
-              <a:t>Guided Yelloweye</a:t>
-            </a:r>
-          </a:p>
-        </p:txBody>
-      </p:sp>
-      <p:sp>
-        <p:nvSpPr>
-          <p:cNvPr id="31" name="Rectangle: Rounded Corners 30">
-            <a:extLst>
-              <a:ext uri="{FF2B5EF4-FFF2-40B4-BE49-F238E27FC236}">
-                <a16:creationId xmlns:a16="http://schemas.microsoft.com/office/drawing/2014/main" id="{87559085-1040-1A5B-11EA-F85E03CF65FD}"/>
-              </a:ext>
-            </a:extLst>
-          </p:cNvPr>
-          <p:cNvSpPr/>
-          <p:nvPr/>
-        </p:nvSpPr>
-        <p:spPr>
-          <a:xfrm>
-            <a:off x="227774" y="1655553"/>
-            <a:ext cx="2338839" cy="619125"/>
-          </a:xfrm>
-          <a:prstGeom prst="roundRect">
-            <a:avLst/>
-          </a:prstGeom>
-          <a:solidFill>
-            <a:schemeClr val="bg2"/>
-          </a:solidFill>
-          <a:ln>
-            <a:noFill/>
-          </a:ln>
-        </p:spPr>
-        <p:style>
-          <a:lnRef idx="2">
-            <a:schemeClr val="accent1">
-              <a:shade val="15000"/>
-            </a:schemeClr>
-          </a:lnRef>
-          <a:fillRef idx="1">
-            <a:schemeClr val="accent1"/>
-          </a:fillRef>
-          <a:effectRef idx="0">
-            <a:schemeClr val="accent1"/>
-          </a:effectRef>
-          <a:fontRef idx="minor">
-            <a:schemeClr val="lt1"/>
-          </a:fontRef>
-        </p:style>
-        <p:txBody>
-          <a:bodyPr rtlCol="0" anchor="ctr"/>
-          <a:lstStyle/>
-          <a:p>
-            <a:pPr algn="ctr"/>
-            <a:r>
-              <a:rPr lang="en-US" dirty="0">
-                <a:solidFill>
-                  <a:schemeClr val="tx1"/>
-                </a:solidFill>
-              </a:rPr>
               <a:t>Guided Non-pelagic (&lt; 2006)</a:t>
             </a:r>
           </a:p>
@@ -7366,6 +7058,13 @@
           <a:ln>
             <a:noFill/>
           </a:ln>
+          <a:effectLst>
+            <a:outerShdw blurRad="50800" dist="38100" dir="5400000" algn="t" rotWithShape="0">
+              <a:prstClr val="black">
+                <a:alpha val="40000"/>
+              </a:prstClr>
+            </a:outerShdw>
+          </a:effectLst>
         </p:spPr>
         <p:style>
           <a:lnRef idx="2">
@@ -7478,6 +7177,13 @@
           <a:ln>
             <a:noFill/>
           </a:ln>
+          <a:effectLst>
+            <a:outerShdw blurRad="50800" dist="38100" dir="5400000" algn="t" rotWithShape="0">
+              <a:prstClr val="black">
+                <a:alpha val="40000"/>
+              </a:prstClr>
+            </a:outerShdw>
+          </a:effectLst>
         </p:spPr>
         <p:style>
           <a:lnRef idx="2">
@@ -7548,6 +7254,13 @@
           <a:ln>
             <a:noFill/>
           </a:ln>
+          <a:effectLst>
+            <a:outerShdw blurRad="50800" dist="38100" dir="5400000" algn="t" rotWithShape="0">
+              <a:prstClr val="black">
+                <a:alpha val="40000"/>
+              </a:prstClr>
+            </a:outerShdw>
+          </a:effectLst>
         </p:spPr>
         <p:style>
           <a:lnRef idx="2">
@@ -7772,6 +7485,13 @@
           <a:ln>
             <a:noFill/>
           </a:ln>
+          <a:effectLst>
+            <a:outerShdw blurRad="50800" dist="38100" dir="5400000" algn="t" rotWithShape="0">
+              <a:prstClr val="black">
+                <a:alpha val="40000"/>
+              </a:prstClr>
+            </a:outerShdw>
+          </a:effectLst>
         </p:spPr>
         <p:style>
           <a:lnRef idx="2">
@@ -7831,6 +7551,13 @@
           <a:ln>
             <a:noFill/>
           </a:ln>
+          <a:effectLst>
+            <a:outerShdw blurRad="50800" dist="38100" dir="5400000" algn="t" rotWithShape="0">
+              <a:prstClr val="black">
+                <a:alpha val="40000"/>
+              </a:prstClr>
+            </a:outerShdw>
+          </a:effectLst>
         </p:spPr>
         <p:style>
           <a:lnRef idx="2">
@@ -7943,6 +7670,13 @@
           <a:ln>
             <a:noFill/>
           </a:ln>
+          <a:effectLst>
+            <a:outerShdw blurRad="50800" dist="38100" dir="5400000" algn="t" rotWithShape="0">
+              <a:prstClr val="black">
+                <a:alpha val="40000"/>
+              </a:prstClr>
+            </a:outerShdw>
+          </a:effectLst>
         </p:spPr>
         <p:style>
           <a:lnRef idx="2">
@@ -8074,6 +7808,7 @@
           <a:bodyPr rtlCol="0" anchor="ctr"/>
           <a:lstStyle/>
           <a:p>
+            <a:pPr algn="ctr"/>
             <a:r>
               <a:rPr lang="en-US" b="1" dirty="0">
                 <a:solidFill>
@@ -8084,6 +7819,7 @@
             </a:r>
           </a:p>
           <a:p>
+            <a:pPr algn="ctr"/>
             <a:r>
               <a:rPr lang="en-US" b="1" dirty="0">
                 <a:solidFill>
@@ -8179,6 +7915,13 @@
           <a:ln>
             <a:noFill/>
           </a:ln>
+          <a:effectLst>
+            <a:outerShdw blurRad="50800" dist="38100" dir="2700000" algn="tl" rotWithShape="0">
+              <a:prstClr val="black">
+                <a:alpha val="40000"/>
+              </a:prstClr>
+            </a:outerShdw>
+          </a:effectLst>
         </p:spPr>
         <p:style>
           <a:lnRef idx="2">
@@ -8219,7 +7962,7 @@
         </p:nvSpPr>
         <p:spPr>
           <a:xfrm>
-            <a:off x="940392" y="3797385"/>
+            <a:off x="1010817" y="3722765"/>
             <a:ext cx="2284971" cy="548512"/>
           </a:xfrm>
           <a:prstGeom prst="roundRect">
@@ -8257,7 +8000,18 @@
                   <a:schemeClr val="tx1"/>
                 </a:solidFill>
               </a:rPr>
-              <a:t>Logbook pH</a:t>
+              <a:t>Guided pH</a:t>
+            </a:r>
+          </a:p>
+          <a:p>
+            <a:pPr algn="ctr"/>
+            <a:r>
+              <a:rPr lang="en-US" b="1" dirty="0">
+                <a:solidFill>
+                  <a:schemeClr val="tx1"/>
+                </a:solidFill>
+              </a:rPr>
+              <a:t>(Logbook pH)</a:t>
             </a:r>
           </a:p>
         </p:txBody>
@@ -8288,6 +8042,13 @@
           <a:ln>
             <a:noFill/>
           </a:ln>
+          <a:effectLst>
+            <a:outerShdw blurRad="50800" dist="38100" dir="5400000" algn="t" rotWithShape="0">
+              <a:prstClr val="black">
+                <a:alpha val="40000"/>
+              </a:prstClr>
+            </a:outerShdw>
+          </a:effectLst>
         </p:spPr>
         <p:style>
           <a:lnRef idx="2">
@@ -8347,6 +8108,13 @@
           <a:ln>
             <a:noFill/>
           </a:ln>
+          <a:effectLst>
+            <a:outerShdw blurRad="50800" dist="38100" dir="5400000" algn="t" rotWithShape="0">
+              <a:prstClr val="black">
+                <a:alpha val="40000"/>
+              </a:prstClr>
+            </a:outerShdw>
+          </a:effectLst>
         </p:spPr>
         <p:style>
           <a:lnRef idx="2">
@@ -8406,6 +8174,13 @@
           <a:ln>
             <a:noFill/>
           </a:ln>
+          <a:effectLst>
+            <a:outerShdw blurRad="50800" dist="38100" dir="5400000" algn="t" rotWithShape="0">
+              <a:prstClr val="black">
+                <a:alpha val="40000"/>
+              </a:prstClr>
+            </a:outerShdw>
+          </a:effectLst>
         </p:spPr>
         <p:style>
           <a:lnRef idx="2">
@@ -8458,6 +8233,13 @@
             <a:chOff x="5518306" y="3626587"/>
             <a:chExt cx="2284971" cy="3076093"/>
           </a:xfrm>
+          <a:effectLst>
+            <a:outerShdw blurRad="50800" dist="38100" dir="2700000" algn="tl" rotWithShape="0">
+              <a:prstClr val="black">
+                <a:alpha val="40000"/>
+              </a:prstClr>
+            </a:outerShdw>
+          </a:effectLst>
         </p:grpSpPr>
         <p:sp>
           <p:nvSpPr>
@@ -8596,6 +8378,13 @@
             <a:ln>
               <a:noFill/>
             </a:ln>
+            <a:effectLst>
+              <a:outerShdw blurRad="50800" dist="38100" dir="5400000" algn="t" rotWithShape="0">
+                <a:prstClr val="black">
+                  <a:alpha val="40000"/>
+                </a:prstClr>
+              </a:outerShdw>
+            </a:effectLst>
           </p:spPr>
           <p:style>
             <a:lnRef idx="2">
@@ -8655,6 +8444,13 @@
             <a:ln>
               <a:noFill/>
             </a:ln>
+            <a:effectLst>
+              <a:outerShdw blurRad="50800" dist="38100" dir="5400000" algn="t" rotWithShape="0">
+                <a:prstClr val="black">
+                  <a:alpha val="40000"/>
+                </a:prstClr>
+              </a:outerShdw>
+            </a:effectLst>
           </p:spPr>
           <p:style>
             <a:lnRef idx="2">
@@ -8714,6 +8510,13 @@
             <a:ln>
               <a:noFill/>
             </a:ln>
+            <a:effectLst>
+              <a:outerShdw blurRad="50800" dist="38100" dir="5400000" algn="t" rotWithShape="0">
+                <a:prstClr val="black">
+                  <a:alpha val="40000"/>
+                </a:prstClr>
+              </a:outerShdw>
+            </a:effectLst>
           </p:spPr>
           <p:style>
             <a:lnRef idx="2">
@@ -8827,6 +8630,13 @@
           <a:ln>
             <a:noFill/>
           </a:ln>
+          <a:effectLst>
+            <a:outerShdw blurRad="50800" dist="38100" dir="5400000" algn="t" rotWithShape="0">
+              <a:prstClr val="black">
+                <a:alpha val="40000"/>
+              </a:prstClr>
+            </a:outerShdw>
+          </a:effectLst>
         </p:spPr>
         <p:style>
           <a:lnRef idx="2">
@@ -8942,6 +8752,13 @@
           <a:ln>
             <a:noFill/>
           </a:ln>
+          <a:effectLst>
+            <a:outerShdw blurRad="50800" dist="38100" dir="5400000" algn="t" rotWithShape="0">
+              <a:prstClr val="black">
+                <a:alpha val="40000"/>
+              </a:prstClr>
+            </a:outerShdw>
+          </a:effectLst>
         </p:spPr>
         <p:style>
           <a:lnRef idx="2">
@@ -9001,6 +8818,13 @@
           <a:ln>
             <a:noFill/>
           </a:ln>
+          <a:effectLst>
+            <a:outerShdw blurRad="50800" dist="38100" dir="5400000" algn="t" rotWithShape="0">
+              <a:prstClr val="black">
+                <a:alpha val="40000"/>
+              </a:prstClr>
+            </a:outerShdw>
+          </a:effectLst>
         </p:spPr>
         <p:style>
           <a:lnRef idx="2">
@@ -9060,6 +8884,13 @@
           <a:ln>
             <a:noFill/>
           </a:ln>
+          <a:effectLst>
+            <a:outerShdw blurRad="50800" dist="38100" dir="5400000" algn="t" rotWithShape="0">
+              <a:prstClr val="black">
+                <a:alpha val="40000"/>
+              </a:prstClr>
+            </a:outerShdw>
+          </a:effectLst>
         </p:spPr>
         <p:style>
           <a:lnRef idx="2">
@@ -9119,6 +8950,13 @@
           <a:ln>
             <a:noFill/>
           </a:ln>
+          <a:effectLst>
+            <a:outerShdw blurRad="50800" dist="38100" dir="5400000" algn="t" rotWithShape="0">
+              <a:prstClr val="black">
+                <a:alpha val="40000"/>
+              </a:prstClr>
+            </a:outerShdw>
+          </a:effectLst>
         </p:spPr>
         <p:style>
           <a:lnRef idx="2">
@@ -9147,7 +8985,7 @@
                   <a:schemeClr val="tx1"/>
                 </a:solidFill>
               </a:rPr>
-              <a:t>Unguided Yelloweye Harv</a:t>
+              <a:t>Unguided Yelloweye Harv.</a:t>
             </a:r>
           </a:p>
         </p:txBody>
@@ -9509,59 +9347,24 @@
                                   </p:childTnLst>
                                 </p:cTn>
                               </p:par>
+                            </p:childTnLst>
+                          </p:cTn>
+                        </p:par>
+                        <p:par>
+                          <p:cTn id="8" fill="hold">
+                            <p:stCondLst>
+                              <p:cond delay="500"/>
+                            </p:stCondLst>
+                            <p:childTnLst>
                               <p:par>
-                                <p:cTn id="8" presetID="10" presetClass="entr" presetSubtype="0" fill="hold" grpId="0" nodeType="withEffect">
+                                <p:cTn id="9" presetID="10" presetClass="entr" presetSubtype="0" fill="hold" grpId="0" nodeType="afterEffect">
                                   <p:stCondLst>
                                     <p:cond delay="0"/>
                                   </p:stCondLst>
                                   <p:childTnLst>
                                     <p:set>
                                       <p:cBhvr>
-                                        <p:cTn id="9" dur="1" fill="hold">
-                                          <p:stCondLst>
-                                            <p:cond delay="0"/>
-                                          </p:stCondLst>
-                                        </p:cTn>
-                                        <p:tgtEl>
-                                          <p:spTgt spid="7"/>
-                                        </p:tgtEl>
-                                        <p:attrNameLst>
-                                          <p:attrName>style.visibility</p:attrName>
-                                        </p:attrNameLst>
-                                      </p:cBhvr>
-                                      <p:to>
-                                        <p:strVal val="visible"/>
-                                      </p:to>
-                                    </p:set>
-                                    <p:animEffect transition="in" filter="fade">
-                                      <p:cBhvr>
-                                        <p:cTn id="10" dur="500"/>
-                                        <p:tgtEl>
-                                          <p:spTgt spid="7"/>
-                                        </p:tgtEl>
-                                      </p:cBhvr>
-                                    </p:animEffect>
-                                  </p:childTnLst>
-                                </p:cTn>
-                              </p:par>
-                            </p:childTnLst>
-                          </p:cTn>
-                        </p:par>
-                        <p:par>
-                          <p:cTn id="11" fill="hold">
-                            <p:stCondLst>
-                              <p:cond delay="500"/>
-                            </p:stCondLst>
-                            <p:childTnLst>
-                              <p:par>
-                                <p:cTn id="12" presetID="10" presetClass="entr" presetSubtype="0" fill="hold" grpId="0" nodeType="afterEffect">
-                                  <p:stCondLst>
-                                    <p:cond delay="0"/>
-                                  </p:stCondLst>
-                                  <p:childTnLst>
-                                    <p:set>
-                                      <p:cBhvr>
-                                        <p:cTn id="13" dur="1" fill="hold">
+                                        <p:cTn id="10" dur="1" fill="hold">
                                           <p:stCondLst>
                                             <p:cond delay="0"/>
                                           </p:stCondLst>
@@ -9579,7 +9382,7 @@
                                     </p:set>
                                     <p:animEffect transition="in" filter="fade">
                                       <p:cBhvr>
-                                        <p:cTn id="14" dur="500"/>
+                                        <p:cTn id="11" dur="500"/>
                                         <p:tgtEl>
                                           <p:spTgt spid="9"/>
                                         </p:tgtEl>
@@ -9595,26 +9398,26 @@
                     </p:cTn>
                   </p:par>
                   <p:par>
-                    <p:cTn id="15" fill="hold">
+                    <p:cTn id="12" fill="hold">
                       <p:stCondLst>
                         <p:cond delay="indefinite"/>
                       </p:stCondLst>
                       <p:childTnLst>
                         <p:par>
-                          <p:cTn id="16" fill="hold">
+                          <p:cTn id="13" fill="hold">
                             <p:stCondLst>
                               <p:cond delay="0"/>
                             </p:stCondLst>
                             <p:childTnLst>
                               <p:par>
-                                <p:cTn id="17" presetID="10" presetClass="entr" presetSubtype="0" fill="hold" grpId="0" nodeType="clickEffect">
+                                <p:cTn id="14" presetID="10" presetClass="entr" presetSubtype="0" fill="hold" grpId="0" nodeType="clickEffect">
                                   <p:stCondLst>
                                     <p:cond delay="0"/>
                                   </p:stCondLst>
                                   <p:childTnLst>
                                     <p:set>
                                       <p:cBhvr>
-                                        <p:cTn id="18" dur="1" fill="hold">
+                                        <p:cTn id="15" dur="1" fill="hold">
                                           <p:stCondLst>
                                             <p:cond delay="0"/>
                                           </p:stCondLst>
@@ -9632,7 +9435,7 @@
                                     </p:set>
                                     <p:animEffect transition="in" filter="fade">
                                       <p:cBhvr>
-                                        <p:cTn id="19" dur="500"/>
+                                        <p:cTn id="16" dur="500"/>
                                         <p:tgtEl>
                                           <p:spTgt spid="11"/>
                                         </p:tgtEl>
@@ -9645,20 +9448,20 @@
                           </p:cTn>
                         </p:par>
                         <p:par>
-                          <p:cTn id="20" fill="hold">
+                          <p:cTn id="17" fill="hold">
                             <p:stCondLst>
                               <p:cond delay="500"/>
                             </p:stCondLst>
                             <p:childTnLst>
                               <p:par>
-                                <p:cTn id="21" presetID="10" presetClass="entr" presetSubtype="0" fill="hold" grpId="0" nodeType="afterEffect">
+                                <p:cTn id="18" presetID="10" presetClass="entr" presetSubtype="0" fill="hold" grpId="0" nodeType="afterEffect">
                                   <p:stCondLst>
                                     <p:cond delay="0"/>
                                   </p:stCondLst>
                                   <p:childTnLst>
                                     <p:set>
                                       <p:cBhvr>
-                                        <p:cTn id="22" dur="1" fill="hold">
+                                        <p:cTn id="19" dur="1" fill="hold">
                                           <p:stCondLst>
                                             <p:cond delay="0"/>
                                           </p:stCondLst>
@@ -9676,7 +9479,7 @@
                                     </p:set>
                                     <p:animEffect transition="in" filter="fade">
                                       <p:cBhvr>
-                                        <p:cTn id="23" dur="500"/>
+                                        <p:cTn id="20" dur="500"/>
                                         <p:tgtEl>
                                           <p:spTgt spid="17"/>
                                         </p:tgtEl>
@@ -9685,191 +9488,15 @@
                                   </p:childTnLst>
                                 </p:cTn>
                               </p:par>
-                            </p:childTnLst>
-                          </p:cTn>
-                        </p:par>
-                      </p:childTnLst>
-                    </p:cTn>
-                  </p:par>
-                  <p:par>
-                    <p:cTn id="24" fill="hold">
-                      <p:stCondLst>
-                        <p:cond delay="indefinite"/>
-                      </p:stCondLst>
-                      <p:childTnLst>
-                        <p:par>
-                          <p:cTn id="25" fill="hold">
-                            <p:stCondLst>
-                              <p:cond delay="0"/>
-                            </p:stCondLst>
-                            <p:childTnLst>
                               <p:par>
-                                <p:cTn id="26" presetID="10" presetClass="entr" presetSubtype="0" fill="hold" grpId="0" nodeType="clickEffect">
+                                <p:cTn id="21" presetID="10" presetClass="entr" presetSubtype="0" fill="hold" grpId="0" nodeType="withEffect">
                                   <p:stCondLst>
                                     <p:cond delay="0"/>
                                   </p:stCondLst>
                                   <p:childTnLst>
                                     <p:set>
                                       <p:cBhvr>
-                                        <p:cTn id="27" dur="1" fill="hold">
-                                          <p:stCondLst>
-                                            <p:cond delay="0"/>
-                                          </p:stCondLst>
-                                        </p:cTn>
-                                        <p:tgtEl>
-                                          <p:spTgt spid="16"/>
-                                        </p:tgtEl>
-                                        <p:attrNameLst>
-                                          <p:attrName>style.visibility</p:attrName>
-                                        </p:attrNameLst>
-                                      </p:cBhvr>
-                                      <p:to>
-                                        <p:strVal val="visible"/>
-                                      </p:to>
-                                    </p:set>
-                                    <p:animEffect transition="in" filter="fade">
-                                      <p:cBhvr>
-                                        <p:cTn id="28" dur="500"/>
-                                        <p:tgtEl>
-                                          <p:spTgt spid="16"/>
-                                        </p:tgtEl>
-                                      </p:cBhvr>
-                                    </p:animEffect>
-                                  </p:childTnLst>
-                                </p:cTn>
-                              </p:par>
-                              <p:par>
-                                <p:cTn id="29" presetID="10" presetClass="entr" presetSubtype="0" fill="hold" grpId="0" nodeType="withEffect">
-                                  <p:stCondLst>
-                                    <p:cond delay="0"/>
-                                  </p:stCondLst>
-                                  <p:childTnLst>
-                                    <p:set>
-                                      <p:cBhvr>
-                                        <p:cTn id="30" dur="1" fill="hold">
-                                          <p:stCondLst>
-                                            <p:cond delay="0"/>
-                                          </p:stCondLst>
-                                        </p:cTn>
-                                        <p:tgtEl>
-                                          <p:spTgt spid="15"/>
-                                        </p:tgtEl>
-                                        <p:attrNameLst>
-                                          <p:attrName>style.visibility</p:attrName>
-                                        </p:attrNameLst>
-                                      </p:cBhvr>
-                                      <p:to>
-                                        <p:strVal val="visible"/>
-                                      </p:to>
-                                    </p:set>
-                                    <p:animEffect transition="in" filter="fade">
-                                      <p:cBhvr>
-                                        <p:cTn id="31" dur="500"/>
-                                        <p:tgtEl>
-                                          <p:spTgt spid="15"/>
-                                        </p:tgtEl>
-                                      </p:cBhvr>
-                                    </p:animEffect>
-                                  </p:childTnLst>
-                                </p:cTn>
-                              </p:par>
-                              <p:par>
-                                <p:cTn id="32" presetID="22" presetClass="entr" presetSubtype="4" fill="hold" nodeType="withEffect">
-                                  <p:stCondLst>
-                                    <p:cond delay="0"/>
-                                  </p:stCondLst>
-                                  <p:childTnLst>
-                                    <p:set>
-                                      <p:cBhvr>
-                                        <p:cTn id="33" dur="1" fill="hold">
-                                          <p:stCondLst>
-                                            <p:cond delay="0"/>
-                                          </p:stCondLst>
-                                        </p:cTn>
-                                        <p:tgtEl>
-                                          <p:spTgt spid="27"/>
-                                        </p:tgtEl>
-                                        <p:attrNameLst>
-                                          <p:attrName>style.visibility</p:attrName>
-                                        </p:attrNameLst>
-                                      </p:cBhvr>
-                                      <p:to>
-                                        <p:strVal val="visible"/>
-                                      </p:to>
-                                    </p:set>
-                                    <p:animEffect transition="in" filter="wipe(down)">
-                                      <p:cBhvr>
-                                        <p:cTn id="34" dur="500"/>
-                                        <p:tgtEl>
-                                          <p:spTgt spid="27"/>
-                                        </p:tgtEl>
-                                      </p:cBhvr>
-                                    </p:animEffect>
-                                  </p:childTnLst>
-                                </p:cTn>
-                              </p:par>
-                            </p:childTnLst>
-                          </p:cTn>
-                        </p:par>
-                      </p:childTnLst>
-                    </p:cTn>
-                  </p:par>
-                  <p:par>
-                    <p:cTn id="35" fill="hold">
-                      <p:stCondLst>
-                        <p:cond delay="indefinite"/>
-                      </p:stCondLst>
-                      <p:childTnLst>
-                        <p:par>
-                          <p:cTn id="36" fill="hold">
-                            <p:stCondLst>
-                              <p:cond delay="0"/>
-                            </p:stCondLst>
-                            <p:childTnLst>
-                              <p:par>
-                                <p:cTn id="37" presetID="10" presetClass="entr" presetSubtype="0" fill="hold" grpId="0" nodeType="clickEffect">
-                                  <p:stCondLst>
-                                    <p:cond delay="0"/>
-                                  </p:stCondLst>
-                                  <p:childTnLst>
-                                    <p:set>
-                                      <p:cBhvr>
-                                        <p:cTn id="38" dur="1" fill="hold">
-                                          <p:stCondLst>
-                                            <p:cond delay="0"/>
-                                          </p:stCondLst>
-                                        </p:cTn>
-                                        <p:tgtEl>
-                                          <p:spTgt spid="19"/>
-                                        </p:tgtEl>
-                                        <p:attrNameLst>
-                                          <p:attrName>style.visibility</p:attrName>
-                                        </p:attrNameLst>
-                                      </p:cBhvr>
-                                      <p:to>
-                                        <p:strVal val="visible"/>
-                                      </p:to>
-                                    </p:set>
-                                    <p:animEffect transition="in" filter="fade">
-                                      <p:cBhvr>
-                                        <p:cTn id="39" dur="500"/>
-                                        <p:tgtEl>
-                                          <p:spTgt spid="19"/>
-                                        </p:tgtEl>
-                                      </p:cBhvr>
-                                    </p:animEffect>
-                                  </p:childTnLst>
-                                </p:cTn>
-                              </p:par>
-                              <p:par>
-                                <p:cTn id="40" presetID="10" presetClass="entr" presetSubtype="0" fill="hold" grpId="0" nodeType="withEffect">
-                                  <p:stCondLst>
-                                    <p:cond delay="0"/>
-                                  </p:stCondLst>
-                                  <p:childTnLst>
-                                    <p:set>
-                                      <p:cBhvr>
-                                        <p:cTn id="41" dur="1" fill="hold">
+                                        <p:cTn id="22" dur="1" fill="hold">
                                           <p:stCondLst>
                                             <p:cond delay="0"/>
                                           </p:stCondLst>
@@ -9887,7 +9514,7 @@
                                     </p:set>
                                     <p:animEffect transition="in" filter="fade">
                                       <p:cBhvr>
-                                        <p:cTn id="42" dur="500"/>
+                                        <p:cTn id="23" dur="500"/>
                                         <p:tgtEl>
                                           <p:spTgt spid="24"/>
                                         </p:tgtEl>
@@ -9897,14 +9524,14 @@
                                 </p:cTn>
                               </p:par>
                               <p:par>
-                                <p:cTn id="43" presetID="10" presetClass="entr" presetSubtype="0" fill="hold" grpId="0" nodeType="withEffect">
+                                <p:cTn id="24" presetID="10" presetClass="entr" presetSubtype="0" fill="hold" grpId="0" nodeType="withEffect">
                                   <p:stCondLst>
                                     <p:cond delay="0"/>
                                   </p:stCondLst>
                                   <p:childTnLst>
                                     <p:set>
                                       <p:cBhvr>
-                                        <p:cTn id="44" dur="1" fill="hold">
+                                        <p:cTn id="25" dur="1" fill="hold">
                                           <p:stCondLst>
                                             <p:cond delay="0"/>
                                           </p:stCondLst>
@@ -9922,7 +9549,7 @@
                                     </p:set>
                                     <p:animEffect transition="in" filter="fade">
                                       <p:cBhvr>
-                                        <p:cTn id="45" dur="500"/>
+                                        <p:cTn id="26" dur="500"/>
                                         <p:tgtEl>
                                           <p:spTgt spid="10"/>
                                         </p:tgtEl>
@@ -9932,14 +9559,14 @@
                                 </p:cTn>
                               </p:par>
                               <p:par>
-                                <p:cTn id="46" presetID="10" presetClass="entr" presetSubtype="0" fill="hold" grpId="0" nodeType="withEffect">
+                                <p:cTn id="27" presetID="10" presetClass="entr" presetSubtype="0" fill="hold" grpId="0" nodeType="withEffect">
                                   <p:stCondLst>
                                     <p:cond delay="0"/>
                                   </p:stCondLst>
                                   <p:childTnLst>
                                     <p:set>
                                       <p:cBhvr>
-                                        <p:cTn id="47" dur="1" fill="hold">
+                                        <p:cTn id="28" dur="1" fill="hold">
                                           <p:stCondLst>
                                             <p:cond delay="0"/>
                                           </p:stCondLst>
@@ -9957,7 +9584,7 @@
                                     </p:set>
                                     <p:animEffect transition="in" filter="fade">
                                       <p:cBhvr>
-                                        <p:cTn id="48" dur="500"/>
+                                        <p:cTn id="29" dur="500"/>
                                         <p:tgtEl>
                                           <p:spTgt spid="13"/>
                                         </p:tgtEl>
@@ -9967,7 +9594,218 @@
                                 </p:cTn>
                               </p:par>
                               <p:par>
-                                <p:cTn id="49" presetID="10" presetClass="entr" presetSubtype="0" fill="hold" grpId="0" nodeType="withEffect">
+                                <p:cTn id="30" presetID="10" presetClass="entr" presetSubtype="0" fill="hold" grpId="0" nodeType="withEffect">
+                                  <p:stCondLst>
+                                    <p:cond delay="0"/>
+                                  </p:stCondLst>
+                                  <p:childTnLst>
+                                    <p:set>
+                                      <p:cBhvr>
+                                        <p:cTn id="31" dur="1" fill="hold">
+                                          <p:stCondLst>
+                                            <p:cond delay="0"/>
+                                          </p:stCondLst>
+                                        </p:cTn>
+                                        <p:tgtEl>
+                                          <p:spTgt spid="31"/>
+                                        </p:tgtEl>
+                                        <p:attrNameLst>
+                                          <p:attrName>style.visibility</p:attrName>
+                                        </p:attrNameLst>
+                                      </p:cBhvr>
+                                      <p:to>
+                                        <p:strVal val="visible"/>
+                                      </p:to>
+                                    </p:set>
+                                    <p:animEffect transition="in" filter="fade">
+                                      <p:cBhvr>
+                                        <p:cTn id="32" dur="500"/>
+                                        <p:tgtEl>
+                                          <p:spTgt spid="31"/>
+                                        </p:tgtEl>
+                                      </p:cBhvr>
+                                    </p:animEffect>
+                                  </p:childTnLst>
+                                </p:cTn>
+                              </p:par>
+                              <p:par>
+                                <p:cTn id="33" presetID="10" presetClass="entr" presetSubtype="0" fill="hold" grpId="0" nodeType="withEffect">
+                                  <p:stCondLst>
+                                    <p:cond delay="0"/>
+                                  </p:stCondLst>
+                                  <p:childTnLst>
+                                    <p:set>
+                                      <p:cBhvr>
+                                        <p:cTn id="34" dur="1" fill="hold">
+                                          <p:stCondLst>
+                                            <p:cond delay="0"/>
+                                          </p:stCondLst>
+                                        </p:cTn>
+                                        <p:tgtEl>
+                                          <p:spTgt spid="32"/>
+                                        </p:tgtEl>
+                                        <p:attrNameLst>
+                                          <p:attrName>style.visibility</p:attrName>
+                                        </p:attrNameLst>
+                                      </p:cBhvr>
+                                      <p:to>
+                                        <p:strVal val="visible"/>
+                                      </p:to>
+                                    </p:set>
+                                    <p:animEffect transition="in" filter="fade">
+                                      <p:cBhvr>
+                                        <p:cTn id="35" dur="500"/>
+                                        <p:tgtEl>
+                                          <p:spTgt spid="32"/>
+                                        </p:tgtEl>
+                                      </p:cBhvr>
+                                    </p:animEffect>
+                                  </p:childTnLst>
+                                </p:cTn>
+                              </p:par>
+                              <p:par>
+                                <p:cTn id="36" presetID="10" presetClass="entr" presetSubtype="0" fill="hold" grpId="0" nodeType="withEffect">
+                                  <p:stCondLst>
+                                    <p:cond delay="0"/>
+                                  </p:stCondLst>
+                                  <p:childTnLst>
+                                    <p:set>
+                                      <p:cBhvr>
+                                        <p:cTn id="37" dur="1" fill="hold">
+                                          <p:stCondLst>
+                                            <p:cond delay="0"/>
+                                          </p:stCondLst>
+                                        </p:cTn>
+                                        <p:tgtEl>
+                                          <p:spTgt spid="35"/>
+                                        </p:tgtEl>
+                                        <p:attrNameLst>
+                                          <p:attrName>style.visibility</p:attrName>
+                                        </p:attrNameLst>
+                                      </p:cBhvr>
+                                      <p:to>
+                                        <p:strVal val="visible"/>
+                                      </p:to>
+                                    </p:set>
+                                    <p:animEffect transition="in" filter="fade">
+                                      <p:cBhvr>
+                                        <p:cTn id="38" dur="500"/>
+                                        <p:tgtEl>
+                                          <p:spTgt spid="35"/>
+                                        </p:tgtEl>
+                                      </p:cBhvr>
+                                    </p:animEffect>
+                                  </p:childTnLst>
+                                </p:cTn>
+                              </p:par>
+                              <p:par>
+                                <p:cTn id="39" presetID="10" presetClass="entr" presetSubtype="0" fill="hold" grpId="0" nodeType="withEffect">
+                                  <p:stCondLst>
+                                    <p:cond delay="0"/>
+                                  </p:stCondLst>
+                                  <p:childTnLst>
+                                    <p:set>
+                                      <p:cBhvr>
+                                        <p:cTn id="40" dur="1" fill="hold">
+                                          <p:stCondLst>
+                                            <p:cond delay="0"/>
+                                          </p:stCondLst>
+                                        </p:cTn>
+                                        <p:tgtEl>
+                                          <p:spTgt spid="36"/>
+                                        </p:tgtEl>
+                                        <p:attrNameLst>
+                                          <p:attrName>style.visibility</p:attrName>
+                                        </p:attrNameLst>
+                                      </p:cBhvr>
+                                      <p:to>
+                                        <p:strVal val="visible"/>
+                                      </p:to>
+                                    </p:set>
+                                    <p:animEffect transition="in" filter="fade">
+                                      <p:cBhvr>
+                                        <p:cTn id="41" dur="500"/>
+                                        <p:tgtEl>
+                                          <p:spTgt spid="36"/>
+                                        </p:tgtEl>
+                                      </p:cBhvr>
+                                    </p:animEffect>
+                                  </p:childTnLst>
+                                </p:cTn>
+                              </p:par>
+                            </p:childTnLst>
+                          </p:cTn>
+                        </p:par>
+                      </p:childTnLst>
+                    </p:cTn>
+                  </p:par>
+                  <p:par>
+                    <p:cTn id="42" fill="hold">
+                      <p:stCondLst>
+                        <p:cond delay="indefinite"/>
+                      </p:stCondLst>
+                      <p:childTnLst>
+                        <p:par>
+                          <p:cTn id="43" fill="hold">
+                            <p:stCondLst>
+                              <p:cond delay="0"/>
+                            </p:stCondLst>
+                            <p:childTnLst>
+                              <p:par>
+                                <p:cTn id="44" presetID="10" presetClass="entr" presetSubtype="0" fill="hold" grpId="0" nodeType="clickEffect">
+                                  <p:stCondLst>
+                                    <p:cond delay="0"/>
+                                  </p:stCondLst>
+                                  <p:childTnLst>
+                                    <p:set>
+                                      <p:cBhvr>
+                                        <p:cTn id="45" dur="1" fill="hold">
+                                          <p:stCondLst>
+                                            <p:cond delay="0"/>
+                                          </p:stCondLst>
+                                        </p:cTn>
+                                        <p:tgtEl>
+                                          <p:spTgt spid="38"/>
+                                        </p:tgtEl>
+                                        <p:attrNameLst>
+                                          <p:attrName>style.visibility</p:attrName>
+                                        </p:attrNameLst>
+                                      </p:cBhvr>
+                                      <p:to>
+                                        <p:strVal val="visible"/>
+                                      </p:to>
+                                    </p:set>
+                                    <p:animEffect transition="in" filter="fade">
+                                      <p:cBhvr>
+                                        <p:cTn id="46" dur="500"/>
+                                        <p:tgtEl>
+                                          <p:spTgt spid="38"/>
+                                        </p:tgtEl>
+                                      </p:cBhvr>
+                                    </p:animEffect>
+                                  </p:childTnLst>
+                                </p:cTn>
+                              </p:par>
+                            </p:childTnLst>
+                          </p:cTn>
+                        </p:par>
+                      </p:childTnLst>
+                    </p:cTn>
+                  </p:par>
+                  <p:par>
+                    <p:cTn id="47" fill="hold">
+                      <p:stCondLst>
+                        <p:cond delay="indefinite"/>
+                      </p:stCondLst>
+                      <p:childTnLst>
+                        <p:par>
+                          <p:cTn id="48" fill="hold">
+                            <p:stCondLst>
+                              <p:cond delay="0"/>
+                            </p:stCondLst>
+                            <p:childTnLst>
+                              <p:par>
+                                <p:cTn id="49" presetID="10" presetClass="entr" presetSubtype="0" fill="hold" grpId="0" nodeType="clickEffect">
                                   <p:stCondLst>
                                     <p:cond delay="0"/>
                                   </p:stCondLst>
@@ -9980,7 +9818,7 @@
                                           </p:stCondLst>
                                         </p:cTn>
                                         <p:tgtEl>
-                                          <p:spTgt spid="29"/>
+                                          <p:spTgt spid="39"/>
                                         </p:tgtEl>
                                         <p:attrNameLst>
                                           <p:attrName>style.visibility</p:attrName>
@@ -9994,7 +9832,7 @@
                                       <p:cBhvr>
                                         <p:cTn id="51" dur="500"/>
                                         <p:tgtEl>
-                                          <p:spTgt spid="29"/>
+                                          <p:spTgt spid="39"/>
                                         </p:tgtEl>
                                       </p:cBhvr>
                                     </p:animEffect>
@@ -10015,7 +9853,7 @@
                                           </p:stCondLst>
                                         </p:cTn>
                                         <p:tgtEl>
-                                          <p:spTgt spid="31"/>
+                                          <p:spTgt spid="40"/>
                                         </p:tgtEl>
                                         <p:attrNameLst>
                                           <p:attrName>style.visibility</p:attrName>
@@ -10029,7 +9867,7 @@
                                       <p:cBhvr>
                                         <p:cTn id="54" dur="500"/>
                                         <p:tgtEl>
-                                          <p:spTgt spid="31"/>
+                                          <p:spTgt spid="40"/>
                                         </p:tgtEl>
                                       </p:cBhvr>
                                     </p:animEffect>
@@ -10050,7 +9888,7 @@
                                           </p:stCondLst>
                                         </p:cTn>
                                         <p:tgtEl>
-                                          <p:spTgt spid="32"/>
+                                          <p:spTgt spid="42"/>
                                         </p:tgtEl>
                                         <p:attrNameLst>
                                           <p:attrName>style.visibility</p:attrName>
@@ -10064,7 +9902,7 @@
                                       <p:cBhvr>
                                         <p:cTn id="57" dur="500"/>
                                         <p:tgtEl>
-                                          <p:spTgt spid="32"/>
+                                          <p:spTgt spid="42"/>
                                         </p:tgtEl>
                                       </p:cBhvr>
                                     </p:animEffect>
@@ -10085,7 +9923,7 @@
                                           </p:stCondLst>
                                         </p:cTn>
                                         <p:tgtEl>
-                                          <p:spTgt spid="35"/>
+                                          <p:spTgt spid="44"/>
                                         </p:tgtEl>
                                         <p:attrNameLst>
                                           <p:attrName>style.visibility</p:attrName>
@@ -10099,42 +9937,7 @@
                                       <p:cBhvr>
                                         <p:cTn id="60" dur="500"/>
                                         <p:tgtEl>
-                                          <p:spTgt spid="35"/>
-                                        </p:tgtEl>
-                                      </p:cBhvr>
-                                    </p:animEffect>
-                                  </p:childTnLst>
-                                </p:cTn>
-                              </p:par>
-                              <p:par>
-                                <p:cTn id="61" presetID="10" presetClass="entr" presetSubtype="0" fill="hold" grpId="0" nodeType="withEffect">
-                                  <p:stCondLst>
-                                    <p:cond delay="0"/>
-                                  </p:stCondLst>
-                                  <p:childTnLst>
-                                    <p:set>
-                                      <p:cBhvr>
-                                        <p:cTn id="62" dur="1" fill="hold">
-                                          <p:stCondLst>
-                                            <p:cond delay="0"/>
-                                          </p:stCondLst>
-                                        </p:cTn>
-                                        <p:tgtEl>
-                                          <p:spTgt spid="36"/>
-                                        </p:tgtEl>
-                                        <p:attrNameLst>
-                                          <p:attrName>style.visibility</p:attrName>
-                                        </p:attrNameLst>
-                                      </p:cBhvr>
-                                      <p:to>
-                                        <p:strVal val="visible"/>
-                                      </p:to>
-                                    </p:set>
-                                    <p:animEffect transition="in" filter="fade">
-                                      <p:cBhvr>
-                                        <p:cTn id="63" dur="500"/>
-                                        <p:tgtEl>
-                                          <p:spTgt spid="36"/>
+                                          <p:spTgt spid="44"/>
                                         </p:tgtEl>
                                       </p:cBhvr>
                                     </p:animEffect>
@@ -10148,19 +9951,54 @@
                     </p:cTn>
                   </p:par>
                   <p:par>
-                    <p:cTn id="64" fill="hold">
+                    <p:cTn id="61" fill="hold">
                       <p:stCondLst>
                         <p:cond delay="indefinite"/>
                       </p:stCondLst>
                       <p:childTnLst>
                         <p:par>
-                          <p:cTn id="65" fill="hold">
+                          <p:cTn id="62" fill="hold">
                             <p:stCondLst>
                               <p:cond delay="0"/>
                             </p:stCondLst>
                             <p:childTnLst>
                               <p:par>
-                                <p:cTn id="66" presetID="10" presetClass="entr" presetSubtype="0" fill="hold" grpId="0" nodeType="clickEffect">
+                                <p:cTn id="63" presetID="10" presetClass="entr" presetSubtype="0" fill="hold" grpId="0" nodeType="clickEffect">
+                                  <p:stCondLst>
+                                    <p:cond delay="0"/>
+                                  </p:stCondLst>
+                                  <p:childTnLst>
+                                    <p:set>
+                                      <p:cBhvr>
+                                        <p:cTn id="64" dur="1" fill="hold">
+                                          <p:stCondLst>
+                                            <p:cond delay="0"/>
+                                          </p:stCondLst>
+                                        </p:cTn>
+                                        <p:tgtEl>
+                                          <p:spTgt spid="48"/>
+                                        </p:tgtEl>
+                                        <p:attrNameLst>
+                                          <p:attrName>style.visibility</p:attrName>
+                                        </p:attrNameLst>
+                                      </p:cBhvr>
+                                      <p:to>
+                                        <p:strVal val="visible"/>
+                                      </p:to>
+                                    </p:set>
+                                    <p:animEffect transition="in" filter="fade">
+                                      <p:cBhvr>
+                                        <p:cTn id="65" dur="500"/>
+                                        <p:tgtEl>
+                                          <p:spTgt spid="48"/>
+                                        </p:tgtEl>
+                                      </p:cBhvr>
+                                    </p:animEffect>
+                                  </p:childTnLst>
+                                </p:cTn>
+                              </p:par>
+                              <p:par>
+                                <p:cTn id="66" presetID="10" presetClass="entr" presetSubtype="0" fill="hold" grpId="0" nodeType="withEffect">
                                   <p:stCondLst>
                                     <p:cond delay="0"/>
                                   </p:stCondLst>
@@ -10173,7 +10011,7 @@
                                           </p:stCondLst>
                                         </p:cTn>
                                         <p:tgtEl>
-                                          <p:spTgt spid="38"/>
+                                          <p:spTgt spid="49"/>
                                         </p:tgtEl>
                                         <p:attrNameLst>
                                           <p:attrName>style.visibility</p:attrName>
@@ -10187,7 +10025,42 @@
                                       <p:cBhvr>
                                         <p:cTn id="68" dur="500"/>
                                         <p:tgtEl>
-                                          <p:spTgt spid="38"/>
+                                          <p:spTgt spid="49"/>
+                                        </p:tgtEl>
+                                      </p:cBhvr>
+                                    </p:animEffect>
+                                  </p:childTnLst>
+                                </p:cTn>
+                              </p:par>
+                              <p:par>
+                                <p:cTn id="69" presetID="10" presetClass="entr" presetSubtype="0" fill="hold" grpId="0" nodeType="withEffect">
+                                  <p:stCondLst>
+                                    <p:cond delay="0"/>
+                                  </p:stCondLst>
+                                  <p:childTnLst>
+                                    <p:set>
+                                      <p:cBhvr>
+                                        <p:cTn id="70" dur="1" fill="hold">
+                                          <p:stCondLst>
+                                            <p:cond delay="0"/>
+                                          </p:stCondLst>
+                                        </p:cTn>
+                                        <p:tgtEl>
+                                          <p:spTgt spid="53"/>
+                                        </p:tgtEl>
+                                        <p:attrNameLst>
+                                          <p:attrName>style.visibility</p:attrName>
+                                        </p:attrNameLst>
+                                      </p:cBhvr>
+                                      <p:to>
+                                        <p:strVal val="visible"/>
+                                      </p:to>
+                                    </p:set>
+                                    <p:animEffect transition="in" filter="fade">
+                                      <p:cBhvr>
+                                        <p:cTn id="71" dur="500"/>
+                                        <p:tgtEl>
+                                          <p:spTgt spid="53"/>
                                         </p:tgtEl>
                                       </p:cBhvr>
                                     </p:animEffect>
@@ -10201,54 +10074,19 @@
                     </p:cTn>
                   </p:par>
                   <p:par>
-                    <p:cTn id="69" fill="hold">
+                    <p:cTn id="72" fill="hold">
                       <p:stCondLst>
                         <p:cond delay="indefinite"/>
                       </p:stCondLst>
                       <p:childTnLst>
                         <p:par>
-                          <p:cTn id="70" fill="hold">
+                          <p:cTn id="73" fill="hold">
                             <p:stCondLst>
                               <p:cond delay="0"/>
                             </p:stCondLst>
                             <p:childTnLst>
                               <p:par>
-                                <p:cTn id="71" presetID="10" presetClass="entr" presetSubtype="0" fill="hold" grpId="0" nodeType="clickEffect">
-                                  <p:stCondLst>
-                                    <p:cond delay="0"/>
-                                  </p:stCondLst>
-                                  <p:childTnLst>
-                                    <p:set>
-                                      <p:cBhvr>
-                                        <p:cTn id="72" dur="1" fill="hold">
-                                          <p:stCondLst>
-                                            <p:cond delay="0"/>
-                                          </p:stCondLst>
-                                        </p:cTn>
-                                        <p:tgtEl>
-                                          <p:spTgt spid="39"/>
-                                        </p:tgtEl>
-                                        <p:attrNameLst>
-                                          <p:attrName>style.visibility</p:attrName>
-                                        </p:attrNameLst>
-                                      </p:cBhvr>
-                                      <p:to>
-                                        <p:strVal val="visible"/>
-                                      </p:to>
-                                    </p:set>
-                                    <p:animEffect transition="in" filter="fade">
-                                      <p:cBhvr>
-                                        <p:cTn id="73" dur="500"/>
-                                        <p:tgtEl>
-                                          <p:spTgt spid="39"/>
-                                        </p:tgtEl>
-                                      </p:cBhvr>
-                                    </p:animEffect>
-                                  </p:childTnLst>
-                                </p:cTn>
-                              </p:par>
-                              <p:par>
-                                <p:cTn id="74" presetID="10" presetClass="entr" presetSubtype="0" fill="hold" grpId="0" nodeType="withEffect">
+                                <p:cTn id="74" presetID="10" presetClass="entr" presetSubtype="0" fill="hold" grpId="0" nodeType="clickEffect">
                                   <p:stCondLst>
                                     <p:cond delay="0"/>
                                   </p:stCondLst>
@@ -10261,7 +10099,7 @@
                                           </p:stCondLst>
                                         </p:cTn>
                                         <p:tgtEl>
-                                          <p:spTgt spid="40"/>
+                                          <p:spTgt spid="55"/>
                                         </p:tgtEl>
                                         <p:attrNameLst>
                                           <p:attrName>style.visibility</p:attrName>
@@ -10275,7 +10113,7 @@
                                       <p:cBhvr>
                                         <p:cTn id="76" dur="500"/>
                                         <p:tgtEl>
-                                          <p:spTgt spid="40"/>
+                                          <p:spTgt spid="55"/>
                                         </p:tgtEl>
                                       </p:cBhvr>
                                     </p:animEffect>
@@ -10296,7 +10134,7 @@
                                           </p:stCondLst>
                                         </p:cTn>
                                         <p:tgtEl>
-                                          <p:spTgt spid="42"/>
+                                          <p:spTgt spid="60"/>
                                         </p:tgtEl>
                                         <p:attrNameLst>
                                           <p:attrName>style.visibility</p:attrName>
@@ -10310,7 +10148,7 @@
                                       <p:cBhvr>
                                         <p:cTn id="79" dur="500"/>
                                         <p:tgtEl>
-                                          <p:spTgt spid="42"/>
+                                          <p:spTgt spid="60"/>
                                         </p:tgtEl>
                                       </p:cBhvr>
                                     </p:animEffect>
@@ -10331,7 +10169,7 @@
                                           </p:stCondLst>
                                         </p:cTn>
                                         <p:tgtEl>
-                                          <p:spTgt spid="44"/>
+                                          <p:spTgt spid="67"/>
                                         </p:tgtEl>
                                         <p:attrNameLst>
                                           <p:attrName>style.visibility</p:attrName>
@@ -10345,7 +10183,7 @@
                                       <p:cBhvr>
                                         <p:cTn id="82" dur="500"/>
                                         <p:tgtEl>
-                                          <p:spTgt spid="44"/>
+                                          <p:spTgt spid="67"/>
                                         </p:tgtEl>
                                       </p:cBhvr>
                                     </p:animEffect>
@@ -10384,7 +10222,7 @@
                                           </p:stCondLst>
                                         </p:cTn>
                                         <p:tgtEl>
-                                          <p:spTgt spid="48"/>
+                                          <p:spTgt spid="68"/>
                                         </p:tgtEl>
                                         <p:attrNameLst>
                                           <p:attrName>style.visibility</p:attrName>
@@ -10398,7 +10236,7 @@
                                       <p:cBhvr>
                                         <p:cTn id="87" dur="500"/>
                                         <p:tgtEl>
-                                          <p:spTgt spid="48"/>
+                                          <p:spTgt spid="68"/>
                                         </p:tgtEl>
                                       </p:cBhvr>
                                     </p:animEffect>
@@ -10419,7 +10257,7 @@
                                           </p:stCondLst>
                                         </p:cTn>
                                         <p:tgtEl>
-                                          <p:spTgt spid="49"/>
+                                          <p:spTgt spid="70"/>
                                         </p:tgtEl>
                                         <p:attrNameLst>
                                           <p:attrName>style.visibility</p:attrName>
@@ -10433,7 +10271,7 @@
                                       <p:cBhvr>
                                         <p:cTn id="90" dur="500"/>
                                         <p:tgtEl>
-                                          <p:spTgt spid="49"/>
+                                          <p:spTgt spid="70"/>
                                         </p:tgtEl>
                                       </p:cBhvr>
                                     </p:animEffect>
@@ -10454,7 +10292,7 @@
                                           </p:stCondLst>
                                         </p:cTn>
                                         <p:tgtEl>
-                                          <p:spTgt spid="53"/>
+                                          <p:spTgt spid="71"/>
                                         </p:tgtEl>
                                         <p:attrNameLst>
                                           <p:attrName>style.visibility</p:attrName>
@@ -10468,7 +10306,77 @@
                                       <p:cBhvr>
                                         <p:cTn id="93" dur="500"/>
                                         <p:tgtEl>
-                                          <p:spTgt spid="53"/>
+                                          <p:spTgt spid="71"/>
+                                        </p:tgtEl>
+                                      </p:cBhvr>
+                                    </p:animEffect>
+                                  </p:childTnLst>
+                                </p:cTn>
+                              </p:par>
+                              <p:par>
+                                <p:cTn id="94" presetID="10" presetClass="entr" presetSubtype="0" fill="hold" grpId="0" nodeType="withEffect">
+                                  <p:stCondLst>
+                                    <p:cond delay="0"/>
+                                  </p:stCondLst>
+                                  <p:childTnLst>
+                                    <p:set>
+                                      <p:cBhvr>
+                                        <p:cTn id="95" dur="1" fill="hold">
+                                          <p:stCondLst>
+                                            <p:cond delay="0"/>
+                                          </p:stCondLst>
+                                        </p:cTn>
+                                        <p:tgtEl>
+                                          <p:spTgt spid="72"/>
+                                        </p:tgtEl>
+                                        <p:attrNameLst>
+                                          <p:attrName>style.visibility</p:attrName>
+                                        </p:attrNameLst>
+                                      </p:cBhvr>
+                                      <p:to>
+                                        <p:strVal val="visible"/>
+                                      </p:to>
+                                    </p:set>
+                                    <p:animEffect transition="in" filter="fade">
+                                      <p:cBhvr>
+                                        <p:cTn id="96" dur="500"/>
+                                        <p:tgtEl>
+                                          <p:spTgt spid="72"/>
+                                        </p:tgtEl>
+                                      </p:cBhvr>
+                                    </p:animEffect>
+                                  </p:childTnLst>
+                                </p:cTn>
+                              </p:par>
+                              <p:par>
+                                <p:cTn id="97" presetID="10" presetClass="entr" presetSubtype="0" fill="hold" grpId="0" nodeType="withEffect">
+                                  <p:stCondLst>
+                                    <p:cond delay="0"/>
+                                  </p:stCondLst>
+                                  <p:childTnLst>
+                                    <p:set>
+                                      <p:cBhvr>
+                                        <p:cTn id="98" dur="1" fill="hold">
+                                          <p:stCondLst>
+                                            <p:cond delay="0"/>
+                                          </p:stCondLst>
+                                        </p:cTn>
+                                        <p:tgtEl>
+                                          <p:spTgt spid="73"/>
+                                        </p:tgtEl>
+                                        <p:attrNameLst>
+                                          <p:attrName>style.visibility</p:attrName>
+                                        </p:attrNameLst>
+                                      </p:cBhvr>
+                                      <p:to>
+                                        <p:strVal val="visible"/>
+                                      </p:to>
+                                    </p:set>
+                                    <p:animEffect transition="in" filter="fade">
+                                      <p:cBhvr>
+                                        <p:cTn id="99" dur="500"/>
+                                        <p:tgtEl>
+                                          <p:spTgt spid="73"/>
                                         </p:tgtEl>
                                       </p:cBhvr>
                                     </p:animEffect>
@@ -10482,89 +10390,19 @@
                     </p:cTn>
                   </p:par>
                   <p:par>
-                    <p:cTn id="94" fill="hold">
+                    <p:cTn id="100" fill="hold">
                       <p:stCondLst>
                         <p:cond delay="indefinite"/>
                       </p:stCondLst>
                       <p:childTnLst>
                         <p:par>
-                          <p:cTn id="95" fill="hold">
+                          <p:cTn id="101" fill="hold">
                             <p:stCondLst>
                               <p:cond delay="0"/>
                             </p:stCondLst>
                             <p:childTnLst>
                               <p:par>
-                                <p:cTn id="96" presetID="10" presetClass="entr" presetSubtype="0" fill="hold" grpId="0" nodeType="clickEffect">
-                                  <p:stCondLst>
-                                    <p:cond delay="0"/>
-                                  </p:stCondLst>
-                                  <p:childTnLst>
-                                    <p:set>
-                                      <p:cBhvr>
-                                        <p:cTn id="97" dur="1" fill="hold">
-                                          <p:stCondLst>
-                                            <p:cond delay="0"/>
-                                          </p:stCondLst>
-                                        </p:cTn>
-                                        <p:tgtEl>
-                                          <p:spTgt spid="55"/>
-                                        </p:tgtEl>
-                                        <p:attrNameLst>
-                                          <p:attrName>style.visibility</p:attrName>
-                                        </p:attrNameLst>
-                                      </p:cBhvr>
-                                      <p:to>
-                                        <p:strVal val="visible"/>
-                                      </p:to>
-                                    </p:set>
-                                    <p:animEffect transition="in" filter="fade">
-                                      <p:cBhvr>
-                                        <p:cTn id="98" dur="500"/>
-                                        <p:tgtEl>
-                                          <p:spTgt spid="55"/>
-                                        </p:tgtEl>
-                                      </p:cBhvr>
-                                    </p:animEffect>
-                                  </p:childTnLst>
-                                </p:cTn>
-                              </p:par>
-                              <p:par>
-                                <p:cTn id="99" presetID="10" presetClass="entr" presetSubtype="0" fill="hold" grpId="0" nodeType="withEffect">
-                                  <p:stCondLst>
-                                    <p:cond delay="0"/>
-                                  </p:stCondLst>
-                                  <p:childTnLst>
-                                    <p:set>
-                                      <p:cBhvr>
-                                        <p:cTn id="100" dur="1" fill="hold">
-                                          <p:stCondLst>
-                                            <p:cond delay="0"/>
-                                          </p:stCondLst>
-                                        </p:cTn>
-                                        <p:tgtEl>
-                                          <p:spTgt spid="60"/>
-                                        </p:tgtEl>
-                                        <p:attrNameLst>
-                                          <p:attrName>style.visibility</p:attrName>
-                                        </p:attrNameLst>
-                                      </p:cBhvr>
-                                      <p:to>
-                                        <p:strVal val="visible"/>
-                                      </p:to>
-                                    </p:set>
-                                    <p:animEffect transition="in" filter="fade">
-                                      <p:cBhvr>
-                                        <p:cTn id="101" dur="500"/>
-                                        <p:tgtEl>
-                                          <p:spTgt spid="60"/>
-                                        </p:tgtEl>
-                                      </p:cBhvr>
-                                    </p:animEffect>
-                                  </p:childTnLst>
-                                </p:cTn>
-                              </p:par>
-                              <p:par>
-                                <p:cTn id="102" presetID="10" presetClass="entr" presetSubtype="0" fill="hold" grpId="0" nodeType="withEffect">
+                                <p:cTn id="102" presetID="10" presetClass="entr" presetSubtype="0" fill="hold" grpId="0" nodeType="clickEffect">
                                   <p:stCondLst>
                                     <p:cond delay="0"/>
                                   </p:stCondLst>
@@ -10577,7 +10415,7 @@
                                           </p:stCondLst>
                                         </p:cTn>
                                         <p:tgtEl>
-                                          <p:spTgt spid="67"/>
+                                          <p:spTgt spid="76"/>
                                         </p:tgtEl>
                                         <p:attrNameLst>
                                           <p:attrName>style.visibility</p:attrName>
@@ -10591,7 +10429,7 @@
                                       <p:cBhvr>
                                         <p:cTn id="104" dur="500"/>
                                         <p:tgtEl>
-                                          <p:spTgt spid="67"/>
+                                          <p:spTgt spid="76"/>
                                         </p:tgtEl>
                                       </p:cBhvr>
                                     </p:animEffect>
@@ -10630,7 +10468,7 @@
                                           </p:stCondLst>
                                         </p:cTn>
                                         <p:tgtEl>
-                                          <p:spTgt spid="68"/>
+                                          <p:spTgt spid="84"/>
                                         </p:tgtEl>
                                         <p:attrNameLst>
                                           <p:attrName>style.visibility</p:attrName>
@@ -10643,252 +10481,6 @@
                                     <p:animEffect transition="in" filter="fade">
                                       <p:cBhvr>
                                         <p:cTn id="109" dur="500"/>
-                                        <p:tgtEl>
-                                          <p:spTgt spid="68"/>
-                                        </p:tgtEl>
-                                      </p:cBhvr>
-                                    </p:animEffect>
-                                  </p:childTnLst>
-                                </p:cTn>
-                              </p:par>
-                              <p:par>
-                                <p:cTn id="110" presetID="10" presetClass="entr" presetSubtype="0" fill="hold" grpId="0" nodeType="withEffect">
-                                  <p:stCondLst>
-                                    <p:cond delay="0"/>
-                                  </p:stCondLst>
-                                  <p:childTnLst>
-                                    <p:set>
-                                      <p:cBhvr>
-                                        <p:cTn id="111" dur="1" fill="hold">
-                                          <p:stCondLst>
-                                            <p:cond delay="0"/>
-                                          </p:stCondLst>
-                                        </p:cTn>
-                                        <p:tgtEl>
-                                          <p:spTgt spid="70"/>
-                                        </p:tgtEl>
-                                        <p:attrNameLst>
-                                          <p:attrName>style.visibility</p:attrName>
-                                        </p:attrNameLst>
-                                      </p:cBhvr>
-                                      <p:to>
-                                        <p:strVal val="visible"/>
-                                      </p:to>
-                                    </p:set>
-                                    <p:animEffect transition="in" filter="fade">
-                                      <p:cBhvr>
-                                        <p:cTn id="112" dur="500"/>
-                                        <p:tgtEl>
-                                          <p:spTgt spid="70"/>
-                                        </p:tgtEl>
-                                      </p:cBhvr>
-                                    </p:animEffect>
-                                  </p:childTnLst>
-                                </p:cTn>
-                              </p:par>
-                              <p:par>
-                                <p:cTn id="113" presetID="10" presetClass="entr" presetSubtype="0" fill="hold" grpId="0" nodeType="withEffect">
-                                  <p:stCondLst>
-                                    <p:cond delay="0"/>
-                                  </p:stCondLst>
-                                  <p:childTnLst>
-                                    <p:set>
-                                      <p:cBhvr>
-                                        <p:cTn id="114" dur="1" fill="hold">
-                                          <p:stCondLst>
-                                            <p:cond delay="0"/>
-                                          </p:stCondLst>
-                                        </p:cTn>
-                                        <p:tgtEl>
-                                          <p:spTgt spid="71"/>
-                                        </p:tgtEl>
-                                        <p:attrNameLst>
-                                          <p:attrName>style.visibility</p:attrName>
-                                        </p:attrNameLst>
-                                      </p:cBhvr>
-                                      <p:to>
-                                        <p:strVal val="visible"/>
-                                      </p:to>
-                                    </p:set>
-                                    <p:animEffect transition="in" filter="fade">
-                                      <p:cBhvr>
-                                        <p:cTn id="115" dur="500"/>
-                                        <p:tgtEl>
-                                          <p:spTgt spid="71"/>
-                                        </p:tgtEl>
-                                      </p:cBhvr>
-                                    </p:animEffect>
-                                  </p:childTnLst>
-                                </p:cTn>
-                              </p:par>
-                              <p:par>
-                                <p:cTn id="116" presetID="10" presetClass="entr" presetSubtype="0" fill="hold" grpId="0" nodeType="withEffect">
-                                  <p:stCondLst>
-                                    <p:cond delay="0"/>
-                                  </p:stCondLst>
-                                  <p:childTnLst>
-                                    <p:set>
-                                      <p:cBhvr>
-                                        <p:cTn id="117" dur="1" fill="hold">
-                                          <p:stCondLst>
-                                            <p:cond delay="0"/>
-                                          </p:stCondLst>
-                                        </p:cTn>
-                                        <p:tgtEl>
-                                          <p:spTgt spid="72"/>
-                                        </p:tgtEl>
-                                        <p:attrNameLst>
-                                          <p:attrName>style.visibility</p:attrName>
-                                        </p:attrNameLst>
-                                      </p:cBhvr>
-                                      <p:to>
-                                        <p:strVal val="visible"/>
-                                      </p:to>
-                                    </p:set>
-                                    <p:animEffect transition="in" filter="fade">
-                                      <p:cBhvr>
-                                        <p:cTn id="118" dur="500"/>
-                                        <p:tgtEl>
-                                          <p:spTgt spid="72"/>
-                                        </p:tgtEl>
-                                      </p:cBhvr>
-                                    </p:animEffect>
-                                  </p:childTnLst>
-                                </p:cTn>
-                              </p:par>
-                              <p:par>
-                                <p:cTn id="119" presetID="10" presetClass="entr" presetSubtype="0" fill="hold" grpId="0" nodeType="withEffect">
-                                  <p:stCondLst>
-                                    <p:cond delay="0"/>
-                                  </p:stCondLst>
-                                  <p:childTnLst>
-                                    <p:set>
-                                      <p:cBhvr>
-                                        <p:cTn id="120" dur="1" fill="hold">
-                                          <p:stCondLst>
-                                            <p:cond delay="0"/>
-                                          </p:stCondLst>
-                                        </p:cTn>
-                                        <p:tgtEl>
-                                          <p:spTgt spid="73"/>
-                                        </p:tgtEl>
-                                        <p:attrNameLst>
-                                          <p:attrName>style.visibility</p:attrName>
-                                        </p:attrNameLst>
-                                      </p:cBhvr>
-                                      <p:to>
-                                        <p:strVal val="visible"/>
-                                      </p:to>
-                                    </p:set>
-                                    <p:animEffect transition="in" filter="fade">
-                                      <p:cBhvr>
-                                        <p:cTn id="121" dur="500"/>
-                                        <p:tgtEl>
-                                          <p:spTgt spid="73"/>
-                                        </p:tgtEl>
-                                      </p:cBhvr>
-                                    </p:animEffect>
-                                  </p:childTnLst>
-                                </p:cTn>
-                              </p:par>
-                            </p:childTnLst>
-                          </p:cTn>
-                        </p:par>
-                      </p:childTnLst>
-                    </p:cTn>
-                  </p:par>
-                  <p:par>
-                    <p:cTn id="122" fill="hold">
-                      <p:stCondLst>
-                        <p:cond delay="indefinite"/>
-                      </p:stCondLst>
-                      <p:childTnLst>
-                        <p:par>
-                          <p:cTn id="123" fill="hold">
-                            <p:stCondLst>
-                              <p:cond delay="0"/>
-                            </p:stCondLst>
-                            <p:childTnLst>
-                              <p:par>
-                                <p:cTn id="124" presetID="10" presetClass="entr" presetSubtype="0" fill="hold" grpId="0" nodeType="clickEffect">
-                                  <p:stCondLst>
-                                    <p:cond delay="0"/>
-                                  </p:stCondLst>
-                                  <p:childTnLst>
-                                    <p:set>
-                                      <p:cBhvr>
-                                        <p:cTn id="125" dur="1" fill="hold">
-                                          <p:stCondLst>
-                                            <p:cond delay="0"/>
-                                          </p:stCondLst>
-                                        </p:cTn>
-                                        <p:tgtEl>
-                                          <p:spTgt spid="76"/>
-                                        </p:tgtEl>
-                                        <p:attrNameLst>
-                                          <p:attrName>style.visibility</p:attrName>
-                                        </p:attrNameLst>
-                                      </p:cBhvr>
-                                      <p:to>
-                                        <p:strVal val="visible"/>
-                                      </p:to>
-                                    </p:set>
-                                    <p:animEffect transition="in" filter="fade">
-                                      <p:cBhvr>
-                                        <p:cTn id="126" dur="500"/>
-                                        <p:tgtEl>
-                                          <p:spTgt spid="76"/>
-                                        </p:tgtEl>
-                                      </p:cBhvr>
-                                    </p:animEffect>
-                                  </p:childTnLst>
-                                </p:cTn>
-                              </p:par>
-                            </p:childTnLst>
-                          </p:cTn>
-                        </p:par>
-                      </p:childTnLst>
-                    </p:cTn>
-                  </p:par>
-                  <p:par>
-                    <p:cTn id="127" fill="hold">
-                      <p:stCondLst>
-                        <p:cond delay="indefinite"/>
-                      </p:stCondLst>
-                      <p:childTnLst>
-                        <p:par>
-                          <p:cTn id="128" fill="hold">
-                            <p:stCondLst>
-                              <p:cond delay="0"/>
-                            </p:stCondLst>
-                            <p:childTnLst>
-                              <p:par>
-                                <p:cTn id="129" presetID="10" presetClass="entr" presetSubtype="0" fill="hold" grpId="0" nodeType="clickEffect">
-                                  <p:stCondLst>
-                                    <p:cond delay="0"/>
-                                  </p:stCondLst>
-                                  <p:childTnLst>
-                                    <p:set>
-                                      <p:cBhvr>
-                                        <p:cTn id="130" dur="1" fill="hold">
-                                          <p:stCondLst>
-                                            <p:cond delay="0"/>
-                                          </p:stCondLst>
-                                        </p:cTn>
-                                        <p:tgtEl>
-                                          <p:spTgt spid="84"/>
-                                        </p:tgtEl>
-                                        <p:attrNameLst>
-                                          <p:attrName>style.visibility</p:attrName>
-                                        </p:attrNameLst>
-                                      </p:cBhvr>
-                                      <p:to>
-                                        <p:strVal val="visible"/>
-                                      </p:to>
-                                    </p:set>
-                                    <p:animEffect transition="in" filter="fade">
-                                      <p:cBhvr>
-                                        <p:cTn id="131" dur="500"/>
                                         <p:tgtEl>
                                           <p:spTgt spid="84"/>
                                         </p:tgtEl>
@@ -10925,17 +10517,12 @@
       </p:par>
     </p:tnLst>
     <p:bldLst>
-      <p:bldP spid="7" grpId="0" animBg="1"/>
       <p:bldP spid="9" grpId="0"/>
       <p:bldP spid="11" grpId="0" animBg="1"/>
-      <p:bldP spid="15" grpId="0" animBg="1"/>
-      <p:bldP spid="16" grpId="0" animBg="1"/>
       <p:bldP spid="17" grpId="0"/>
-      <p:bldP spid="19" grpId="0" animBg="1"/>
       <p:bldP spid="24" grpId="0" animBg="1"/>
       <p:bldP spid="10" grpId="0" animBg="1"/>
       <p:bldP spid="13" grpId="0" animBg="1"/>
-      <p:bldP spid="29" grpId="0" animBg="1"/>
       <p:bldP spid="31" grpId="0" animBg="1"/>
       <p:bldP spid="32" grpId="0" animBg="1"/>
       <p:bldP spid="35" grpId="0" animBg="1"/>

</xml_diff>

<commit_message>
Report writing and trying to finish up the wt data portion of the model. Oi.
</commit_message>
<xml_diff>
--- a/markdown/release_comp_fig.pptx
+++ b/markdown/release_comp_fig.pptx
@@ -198,7 +198,7 @@
           <a:p>
             <a:fld id="{9C52CAAB-CF90-4FD0-A236-B9E10D665356}" type="datetimeFigureOut">
               <a:rPr lang="en-US" smtClean="0"/>
-              <a:t>5/29/2025</a:t>
+              <a:t>6/3/2025</a:t>
             </a:fld>
             <a:endParaRPr lang="en-US"/>
           </a:p>
@@ -828,7 +828,7 @@
           <a:p>
             <a:fld id="{0C930631-FCD7-49E8-918F-66F6C8B50496}" type="datetimeFigureOut">
               <a:rPr lang="en-US" smtClean="0"/>
-              <a:t>5/29/2025</a:t>
+              <a:t>6/3/2025</a:t>
             </a:fld>
             <a:endParaRPr lang="en-US"/>
           </a:p>
@@ -1026,7 +1026,7 @@
           <a:p>
             <a:fld id="{0C930631-FCD7-49E8-918F-66F6C8B50496}" type="datetimeFigureOut">
               <a:rPr lang="en-US" smtClean="0"/>
-              <a:t>5/29/2025</a:t>
+              <a:t>6/3/2025</a:t>
             </a:fld>
             <a:endParaRPr lang="en-US"/>
           </a:p>
@@ -1234,7 +1234,7 @@
           <a:p>
             <a:fld id="{0C930631-FCD7-49E8-918F-66F6C8B50496}" type="datetimeFigureOut">
               <a:rPr lang="en-US" smtClean="0"/>
-              <a:t>5/29/2025</a:t>
+              <a:t>6/3/2025</a:t>
             </a:fld>
             <a:endParaRPr lang="en-US"/>
           </a:p>
@@ -1432,7 +1432,7 @@
           <a:p>
             <a:fld id="{0C930631-FCD7-49E8-918F-66F6C8B50496}" type="datetimeFigureOut">
               <a:rPr lang="en-US" smtClean="0"/>
-              <a:t>5/29/2025</a:t>
+              <a:t>6/3/2025</a:t>
             </a:fld>
             <a:endParaRPr lang="en-US"/>
           </a:p>
@@ -1707,7 +1707,7 @@
           <a:p>
             <a:fld id="{0C930631-FCD7-49E8-918F-66F6C8B50496}" type="datetimeFigureOut">
               <a:rPr lang="en-US" smtClean="0"/>
-              <a:t>5/29/2025</a:t>
+              <a:t>6/3/2025</a:t>
             </a:fld>
             <a:endParaRPr lang="en-US"/>
           </a:p>
@@ -1972,7 +1972,7 @@
           <a:p>
             <a:fld id="{0C930631-FCD7-49E8-918F-66F6C8B50496}" type="datetimeFigureOut">
               <a:rPr lang="en-US" smtClean="0"/>
-              <a:t>5/29/2025</a:t>
+              <a:t>6/3/2025</a:t>
             </a:fld>
             <a:endParaRPr lang="en-US"/>
           </a:p>
@@ -2384,7 +2384,7 @@
           <a:p>
             <a:fld id="{0C930631-FCD7-49E8-918F-66F6C8B50496}" type="datetimeFigureOut">
               <a:rPr lang="en-US" smtClean="0"/>
-              <a:t>5/29/2025</a:t>
+              <a:t>6/3/2025</a:t>
             </a:fld>
             <a:endParaRPr lang="en-US"/>
           </a:p>
@@ -2525,7 +2525,7 @@
           <a:p>
             <a:fld id="{0C930631-FCD7-49E8-918F-66F6C8B50496}" type="datetimeFigureOut">
               <a:rPr lang="en-US" smtClean="0"/>
-              <a:t>5/29/2025</a:t>
+              <a:t>6/3/2025</a:t>
             </a:fld>
             <a:endParaRPr lang="en-US"/>
           </a:p>
@@ -2638,7 +2638,7 @@
           <a:p>
             <a:fld id="{0C930631-FCD7-49E8-918F-66F6C8B50496}" type="datetimeFigureOut">
               <a:rPr lang="en-US" smtClean="0"/>
-              <a:t>5/29/2025</a:t>
+              <a:t>6/3/2025</a:t>
             </a:fld>
             <a:endParaRPr lang="en-US"/>
           </a:p>
@@ -2949,7 +2949,7 @@
           <a:p>
             <a:fld id="{0C930631-FCD7-49E8-918F-66F6C8B50496}" type="datetimeFigureOut">
               <a:rPr lang="en-US" smtClean="0"/>
-              <a:t>5/29/2025</a:t>
+              <a:t>6/3/2025</a:t>
             </a:fld>
             <a:endParaRPr lang="en-US"/>
           </a:p>
@@ -3237,7 +3237,7 @@
           <a:p>
             <a:fld id="{0C930631-FCD7-49E8-918F-66F6C8B50496}" type="datetimeFigureOut">
               <a:rPr lang="en-US" smtClean="0"/>
-              <a:t>5/29/2025</a:t>
+              <a:t>6/3/2025</a:t>
             </a:fld>
             <a:endParaRPr lang="en-US"/>
           </a:p>
@@ -3478,7 +3478,7 @@
           <a:p>
             <a:fld id="{0C930631-FCD7-49E8-918F-66F6C8B50496}" type="datetimeFigureOut">
               <a:rPr lang="en-US" smtClean="0"/>
-              <a:t>5/29/2025</a:t>
+              <a:t>6/3/2025</a:t>
             </a:fld>
             <a:endParaRPr lang="en-US"/>
           </a:p>
@@ -6667,7 +6667,7 @@
         <p:spPr>
           <a:xfrm>
             <a:off x="3516436" y="2461639"/>
-            <a:ext cx="3404394" cy="646331"/>
+            <a:ext cx="3404394" cy="369332"/>
           </a:xfrm>
           <a:prstGeom prst="rect">
             <a:avLst/>
@@ -6682,16 +6682,6 @@
             <a:spAutoFit/>
           </a:bodyPr>
           <a:lstStyle/>
-          <a:p>
-            <a:pPr marL="285750" indent="-285750">
-              <a:buFont typeface="Century Gothic" panose="020B0502020202020204" pitchFamily="34" charset="0"/>
-              <a:buChar char="→"/>
-            </a:pPr>
-            <a:r>
-              <a:rPr lang="en-US" dirty="0"/>
-              <a:t>Ignores different biases</a:t>
-            </a:r>
-          </a:p>
           <a:p>
             <a:pPr marL="285750" indent="-285750">
               <a:buFont typeface="Century Gothic" panose="020B0502020202020204" pitchFamily="34" charset="0"/>
@@ -7882,7 +7872,7 @@
                   <a:schemeClr val="tx1"/>
                 </a:solidFill>
               </a:rPr>
-              <a:t>Howard et al . Methods</a:t>
+              <a:t>Howard Methods</a:t>
             </a:r>
           </a:p>
         </p:txBody>
@@ -9161,13 +9151,15 @@
               </a:ext>
             </a:extLst>
           </p:cNvPr>
-          <p:cNvCxnSpPr/>
+          <p:cNvCxnSpPr>
+            <a:cxnSpLocks/>
+          </p:cNvCxnSpPr>
           <p:nvPr/>
         </p:nvCxnSpPr>
         <p:spPr>
           <a:xfrm flipV="1">
             <a:off x="3613124" y="1909694"/>
-            <a:ext cx="0" cy="1020593"/>
+            <a:ext cx="0" cy="742557"/>
           </a:xfrm>
           <a:prstGeom prst="line">
             <a:avLst/>

</xml_diff>